<commit_message>
Update to presentation, free energy functional
</commit_message>
<xml_diff>
--- a/CPC_presentation.pptx
+++ b/CPC_presentation.pptx
@@ -5,20 +5,21 @@
     <p:sldMasterId id="2147483648" r:id="rId1"/>
   </p:sldMasterIdLst>
   <p:notesMasterIdLst>
-    <p:notesMasterId r:id="rId13"/>
+    <p:notesMasterId r:id="rId14"/>
   </p:notesMasterIdLst>
   <p:sldIdLst>
     <p:sldId id="289" r:id="rId2"/>
-    <p:sldId id="295" r:id="rId3"/>
-    <p:sldId id="288" r:id="rId4"/>
+    <p:sldId id="288" r:id="rId3"/>
+    <p:sldId id="299" r:id="rId4"/>
     <p:sldId id="261" r:id="rId5"/>
-    <p:sldId id="291" r:id="rId6"/>
-    <p:sldId id="292" r:id="rId7"/>
-    <p:sldId id="256" r:id="rId8"/>
-    <p:sldId id="296" r:id="rId9"/>
-    <p:sldId id="287" r:id="rId10"/>
+    <p:sldId id="292" r:id="rId6"/>
+    <p:sldId id="298" r:id="rId7"/>
+    <p:sldId id="300" r:id="rId8"/>
+    <p:sldId id="297" r:id="rId9"/>
+    <p:sldId id="296" r:id="rId10"/>
     <p:sldId id="267" r:id="rId11"/>
     <p:sldId id="290" r:id="rId12"/>
+    <p:sldId id="287" r:id="rId13"/>
   </p:sldIdLst>
   <p:sldSz cx="9144000" cy="6858000" type="screen4x3"/>
   <p:notesSz cx="6858000" cy="9144000"/>
@@ -202,7 +203,7 @@
           <a:p>
             <a:fld id="{E9BA8D2F-CCA5-4C4A-88FC-1F27C4AE0372}" type="datetimeFigureOut">
               <a:rPr lang="en-US" smtClean="0"/>
-              <a:t>30/11/15</a:t>
+              <a:t>02/12/15</a:t>
             </a:fld>
             <a:endParaRPr lang="en-US"/>
           </a:p>
@@ -516,11 +517,11 @@
           <a:p>
             <a:r>
               <a:rPr lang="en-US" dirty="0" smtClean="0"/>
-              <a:t>Make</a:t>
+              <a:t>You have this model with the priors, and now you want to estimate the posterior</a:t>
             </a:r>
             <a:r>
               <a:rPr lang="en-US" baseline="0" dirty="0" smtClean="0"/>
-              <a:t> sure to motivate this well</a:t>
+              <a:t> and now we want to approximate it</a:t>
             </a:r>
           </a:p>
           <a:p>
@@ -554,7 +555,7 @@
     </p:spTree>
     <p:extLst>
       <p:ext uri="{BB962C8B-B14F-4D97-AF65-F5344CB8AC3E}">
-        <p14:creationId xmlns:p14="http://schemas.microsoft.com/office/powerpoint/2010/main" val="358995777"/>
+        <p14:creationId xmlns:p14="http://schemas.microsoft.com/office/powerpoint/2010/main" val="2217688792"/>
       </p:ext>
     </p:extLst>
   </p:cSld>
@@ -742,6 +743,182 @@
 </p:notes>
 </file>
 
+<file path=ppt/notesSlides/notesSlide4.xml><?xml version="1.0" encoding="utf-8"?>
+<p:notes xmlns:a="http://schemas.openxmlformats.org/drawingml/2006/main" xmlns:r="http://schemas.openxmlformats.org/officeDocument/2006/relationships" xmlns:p="http://schemas.openxmlformats.org/presentationml/2006/main">
+  <p:cSld>
+    <p:spTree>
+      <p:nvGrpSpPr>
+        <p:cNvPr id="1" name=""/>
+        <p:cNvGrpSpPr/>
+        <p:nvPr/>
+      </p:nvGrpSpPr>
+      <p:grpSpPr>
+        <a:xfrm>
+          <a:off x="0" y="0"/>
+          <a:ext cx="0" cy="0"/>
+          <a:chOff x="0" y="0"/>
+          <a:chExt cx="0" cy="0"/>
+        </a:xfrm>
+      </p:grpSpPr>
+      <p:sp>
+        <p:nvSpPr>
+          <p:cNvPr id="2" name="Slide Image Placeholder 1"/>
+          <p:cNvSpPr>
+            <a:spLocks noGrp="1" noRot="1" noChangeAspect="1"/>
+          </p:cNvSpPr>
+          <p:nvPr>
+            <p:ph type="sldImg"/>
+          </p:nvPr>
+        </p:nvSpPr>
+        <p:spPr/>
+      </p:sp>
+      <p:sp>
+        <p:nvSpPr>
+          <p:cNvPr id="3" name="Notes Placeholder 2"/>
+          <p:cNvSpPr>
+            <a:spLocks noGrp="1"/>
+          </p:cNvSpPr>
+          <p:nvPr>
+            <p:ph type="body" idx="1"/>
+          </p:nvPr>
+        </p:nvSpPr>
+        <p:spPr/>
+        <p:txBody>
+          <a:bodyPr/>
+          <a:lstStyle/>
+          <a:p>
+            <a:endParaRPr lang="en-US" dirty="0"/>
+          </a:p>
+        </p:txBody>
+      </p:sp>
+      <p:sp>
+        <p:nvSpPr>
+          <p:cNvPr id="4" name="Slide Number Placeholder 3"/>
+          <p:cNvSpPr>
+            <a:spLocks noGrp="1"/>
+          </p:cNvSpPr>
+          <p:nvPr>
+            <p:ph type="sldNum" sz="quarter" idx="10"/>
+          </p:nvPr>
+        </p:nvSpPr>
+        <p:spPr/>
+        <p:txBody>
+          <a:bodyPr/>
+          <a:lstStyle/>
+          <a:p>
+            <a:fld id="{B25B76EB-A2D1-BB46-A4A1-2FC0A7B5B402}" type="slidenum">
+              <a:rPr lang="en-US" smtClean="0"/>
+              <a:t>8</a:t>
+            </a:fld>
+            <a:endParaRPr lang="en-US"/>
+          </a:p>
+        </p:txBody>
+      </p:sp>
+    </p:spTree>
+    <p:extLst>
+      <p:ext uri="{BB962C8B-B14F-4D97-AF65-F5344CB8AC3E}">
+        <p14:creationId xmlns:p14="http://schemas.microsoft.com/office/powerpoint/2010/main" val="1470256327"/>
+      </p:ext>
+    </p:extLst>
+  </p:cSld>
+  <p:clrMapOvr>
+    <a:masterClrMapping/>
+  </p:clrMapOvr>
+</p:notes>
+</file>
+
+<file path=ppt/notesSlides/notesSlide5.xml><?xml version="1.0" encoding="utf-8"?>
+<p:notes xmlns:a="http://schemas.openxmlformats.org/drawingml/2006/main" xmlns:r="http://schemas.openxmlformats.org/officeDocument/2006/relationships" xmlns:p="http://schemas.openxmlformats.org/presentationml/2006/main">
+  <p:cSld>
+    <p:spTree>
+      <p:nvGrpSpPr>
+        <p:cNvPr id="1" name=""/>
+        <p:cNvGrpSpPr/>
+        <p:nvPr/>
+      </p:nvGrpSpPr>
+      <p:grpSpPr>
+        <a:xfrm>
+          <a:off x="0" y="0"/>
+          <a:ext cx="0" cy="0"/>
+          <a:chOff x="0" y="0"/>
+          <a:chExt cx="0" cy="0"/>
+        </a:xfrm>
+      </p:grpSpPr>
+      <p:sp>
+        <p:nvSpPr>
+          <p:cNvPr id="2" name="Slide Image Placeholder 1"/>
+          <p:cNvSpPr>
+            <a:spLocks noGrp="1" noRot="1" noChangeAspect="1"/>
+          </p:cNvSpPr>
+          <p:nvPr>
+            <p:ph type="sldImg"/>
+          </p:nvPr>
+        </p:nvSpPr>
+        <p:spPr/>
+      </p:sp>
+      <p:sp>
+        <p:nvSpPr>
+          <p:cNvPr id="3" name="Notes Placeholder 2"/>
+          <p:cNvSpPr>
+            <a:spLocks noGrp="1"/>
+          </p:cNvSpPr>
+          <p:nvPr>
+            <p:ph type="body" idx="1"/>
+          </p:nvPr>
+        </p:nvSpPr>
+        <p:spPr/>
+        <p:txBody>
+          <a:bodyPr/>
+          <a:lstStyle/>
+          <a:p>
+            <a:r>
+              <a:rPr lang="en-US" dirty="0" smtClean="0"/>
+              <a:t>Brief</a:t>
+            </a:r>
+            <a:r>
+              <a:rPr lang="en-US" baseline="0" dirty="0" smtClean="0"/>
+              <a:t> discussion of control as optimality, of boundedness as a representation of perceived control in a cognitive task.</a:t>
+            </a:r>
+            <a:endParaRPr lang="en-US" dirty="0"/>
+          </a:p>
+        </p:txBody>
+      </p:sp>
+      <p:sp>
+        <p:nvSpPr>
+          <p:cNvPr id="4" name="Slide Number Placeholder 3"/>
+          <p:cNvSpPr>
+            <a:spLocks noGrp="1"/>
+          </p:cNvSpPr>
+          <p:nvPr>
+            <p:ph type="sldNum" sz="quarter" idx="10"/>
+          </p:nvPr>
+        </p:nvSpPr>
+        <p:spPr/>
+        <p:txBody>
+          <a:bodyPr/>
+          <a:lstStyle/>
+          <a:p>
+            <a:fld id="{B25B76EB-A2D1-BB46-A4A1-2FC0A7B5B402}" type="slidenum">
+              <a:rPr lang="en-US" smtClean="0"/>
+              <a:t>9</a:t>
+            </a:fld>
+            <a:endParaRPr lang="en-US"/>
+          </a:p>
+        </p:txBody>
+      </p:sp>
+    </p:spTree>
+    <p:extLst>
+      <p:ext uri="{BB962C8B-B14F-4D97-AF65-F5344CB8AC3E}">
+        <p14:creationId xmlns:p14="http://schemas.microsoft.com/office/powerpoint/2010/main" val="4073611852"/>
+      </p:ext>
+    </p:extLst>
+  </p:cSld>
+  <p:clrMapOvr>
+    <a:masterClrMapping/>
+  </p:clrMapOvr>
+</p:notes>
+</file>
+
 <file path=ppt/slideLayouts/slideLayout1.xml><?xml version="1.0" encoding="utf-8"?>
 <p:sldLayout xmlns:a="http://schemas.openxmlformats.org/drawingml/2006/main" xmlns:r="http://schemas.openxmlformats.org/officeDocument/2006/relationships" xmlns:p="http://schemas.openxmlformats.org/presentationml/2006/main" type="title" preserve="1">
   <p:cSld name="Title Slide">
@@ -923,7 +1100,7 @@
           <a:p>
             <a:fld id="{A4B0298F-02D1-674A-8D98-872E198EB581}" type="datetimeFigureOut">
               <a:rPr lang="en-US" smtClean="0"/>
-              <a:t>30/11/15</a:t>
+              <a:t>02/12/15</a:t>
             </a:fld>
             <a:endParaRPr lang="en-US"/>
           </a:p>
@@ -1093,7 +1270,7 @@
           <a:p>
             <a:fld id="{A4B0298F-02D1-674A-8D98-872E198EB581}" type="datetimeFigureOut">
               <a:rPr lang="en-US" smtClean="0"/>
-              <a:t>30/11/15</a:t>
+              <a:t>02/12/15</a:t>
             </a:fld>
             <a:endParaRPr lang="en-US"/>
           </a:p>
@@ -1273,7 +1450,7 @@
           <a:p>
             <a:fld id="{A4B0298F-02D1-674A-8D98-872E198EB581}" type="datetimeFigureOut">
               <a:rPr lang="en-US" smtClean="0"/>
-              <a:t>30/11/15</a:t>
+              <a:t>02/12/15</a:t>
             </a:fld>
             <a:endParaRPr lang="en-US"/>
           </a:p>
@@ -1443,7 +1620,7 @@
           <a:p>
             <a:fld id="{A4B0298F-02D1-674A-8D98-872E198EB581}" type="datetimeFigureOut">
               <a:rPr lang="en-US" smtClean="0"/>
-              <a:t>30/11/15</a:t>
+              <a:t>02/12/15</a:t>
             </a:fld>
             <a:endParaRPr lang="en-US"/>
           </a:p>
@@ -1689,7 +1866,7 @@
           <a:p>
             <a:fld id="{A4B0298F-02D1-674A-8D98-872E198EB581}" type="datetimeFigureOut">
               <a:rPr lang="en-US" smtClean="0"/>
-              <a:t>30/11/15</a:t>
+              <a:t>02/12/15</a:t>
             </a:fld>
             <a:endParaRPr lang="en-US"/>
           </a:p>
@@ -1977,7 +2154,7 @@
           <a:p>
             <a:fld id="{A4B0298F-02D1-674A-8D98-872E198EB581}" type="datetimeFigureOut">
               <a:rPr lang="en-US" smtClean="0"/>
-              <a:t>30/11/15</a:t>
+              <a:t>02/12/15</a:t>
             </a:fld>
             <a:endParaRPr lang="en-US"/>
           </a:p>
@@ -2399,7 +2576,7 @@
           <a:p>
             <a:fld id="{A4B0298F-02D1-674A-8D98-872E198EB581}" type="datetimeFigureOut">
               <a:rPr lang="en-US" smtClean="0"/>
-              <a:t>30/11/15</a:t>
+              <a:t>02/12/15</a:t>
             </a:fld>
             <a:endParaRPr lang="en-US"/>
           </a:p>
@@ -2517,7 +2694,7 @@
           <a:p>
             <a:fld id="{A4B0298F-02D1-674A-8D98-872E198EB581}" type="datetimeFigureOut">
               <a:rPr lang="en-US" smtClean="0"/>
-              <a:t>30/11/15</a:t>
+              <a:t>02/12/15</a:t>
             </a:fld>
             <a:endParaRPr lang="en-US"/>
           </a:p>
@@ -2612,7 +2789,7 @@
           <a:p>
             <a:fld id="{A4B0298F-02D1-674A-8D98-872E198EB581}" type="datetimeFigureOut">
               <a:rPr lang="en-US" smtClean="0"/>
-              <a:t>30/11/15</a:t>
+              <a:t>02/12/15</a:t>
             </a:fld>
             <a:endParaRPr lang="en-US"/>
           </a:p>
@@ -2889,7 +3066,7 @@
           <a:p>
             <a:fld id="{A4B0298F-02D1-674A-8D98-872E198EB581}" type="datetimeFigureOut">
               <a:rPr lang="en-US" smtClean="0"/>
-              <a:t>30/11/15</a:t>
+              <a:t>02/12/15</a:t>
             </a:fld>
             <a:endParaRPr lang="en-US"/>
           </a:p>
@@ -3142,7 +3319,7 @@
           <a:p>
             <a:fld id="{A4B0298F-02D1-674A-8D98-872E198EB581}" type="datetimeFigureOut">
               <a:rPr lang="en-US" smtClean="0"/>
-              <a:t>30/11/15</a:t>
+              <a:t>02/12/15</a:t>
             </a:fld>
             <a:endParaRPr lang="en-US"/>
           </a:p>
@@ -3357,7 +3534,7 @@
             <a:fld id="{A4B0298F-02D1-674A-8D98-872E198EB581}" type="datetimeFigureOut">
               <a:rPr lang="en-US" smtClean="0"/>
               <a:pPr/>
-              <a:t>30/11/15</a:t>
+              <a:t>02/12/15</a:t>
             </a:fld>
             <a:endParaRPr lang="en-US" dirty="0"/>
           </a:p>
@@ -3985,13 +4162,15 @@
 </p:sld>
 </file>
 
-<file path=ppt/slides/slide2.xml><?xml version="1.0" encoding="utf-8"?>
+<file path=ppt/slides/slide12.xml><?xml version="1.0" encoding="utf-8"?>
 <p:sld xmlns:a="http://schemas.openxmlformats.org/drawingml/2006/main" xmlns:r="http://schemas.openxmlformats.org/officeDocument/2006/relationships" xmlns:p="http://schemas.openxmlformats.org/presentationml/2006/main">
   <p:cSld>
     <p:bg>
       <p:bgPr>
         <a:solidFill>
-          <a:srgbClr val="FF6633"/>
+          <a:schemeClr val="bg1">
+            <a:lumMod val="85000"/>
+          </a:schemeClr>
         </a:solidFill>
         <a:effectLst/>
       </p:bgPr>
@@ -4022,6 +4201,273 @@
         </p:nvSpPr>
         <p:spPr>
           <a:xfrm>
+            <a:off x="457200" y="411877"/>
+            <a:ext cx="8229600" cy="1143000"/>
+          </a:xfrm>
+        </p:spPr>
+        <p:txBody>
+          <a:bodyPr>
+            <a:normAutofit/>
+          </a:bodyPr>
+          <a:lstStyle/>
+          <a:p>
+            <a:pPr algn="l"/>
+            <a:r>
+              <a:rPr lang="en-US" sz="6000" dirty="0" smtClean="0"/>
+              <a:t>Control as Optimality</a:t>
+            </a:r>
+            <a:endParaRPr lang="en-US" sz="6000" dirty="0"/>
+          </a:p>
+        </p:txBody>
+      </p:sp>
+      <p:sp>
+        <p:nvSpPr>
+          <p:cNvPr id="3" name="Content Placeholder 2"/>
+          <p:cNvSpPr>
+            <a:spLocks noGrp="1"/>
+          </p:cNvSpPr>
+          <p:nvPr>
+            <p:ph idx="1"/>
+          </p:nvPr>
+        </p:nvSpPr>
+        <p:spPr>
+          <a:xfrm>
+            <a:off x="634968" y="1567380"/>
+            <a:ext cx="7806366" cy="4749124"/>
+          </a:xfrm>
+        </p:spPr>
+        <p:txBody>
+          <a:bodyPr>
+            <a:normAutofit/>
+          </a:bodyPr>
+          <a:lstStyle/>
+          <a:p>
+            <a:pPr marL="0" indent="0">
+              <a:buNone/>
+            </a:pPr>
+            <a:r>
+              <a:rPr lang="en-US" sz="2800" dirty="0" smtClean="0">
+                <a:solidFill>
+                  <a:srgbClr val="000000"/>
+                </a:solidFill>
+                <a:latin typeface="Open Sans Cond Light"/>
+                <a:ea typeface="Lucida Grande"/>
+                <a:cs typeface="Open Sans Cond Light"/>
+              </a:rPr>
+              <a:t>Optimality </a:t>
+            </a:r>
+            <a:r>
+              <a:rPr lang="en-US" sz="2800" dirty="0" smtClean="0">
+                <a:solidFill>
+                  <a:srgbClr val="000000"/>
+                </a:solidFill>
+                <a:latin typeface="Open Sans Cond Light"/>
+                <a:ea typeface="Lucida Grande"/>
+                <a:cs typeface="Open Sans Cond Light"/>
+              </a:rPr>
+              <a:t>and control are often linked (Todorov, optimal policy model).</a:t>
+            </a:r>
+          </a:p>
+          <a:p>
+            <a:pPr marL="0" indent="0">
+              <a:buNone/>
+            </a:pPr>
+            <a:endParaRPr lang="en-US" sz="2800" dirty="0">
+              <a:solidFill>
+                <a:srgbClr val="000000"/>
+              </a:solidFill>
+              <a:latin typeface="Open Sans Cond Light"/>
+              <a:ea typeface="Lucida Grande"/>
+              <a:cs typeface="Open Sans Cond Light"/>
+            </a:endParaRPr>
+          </a:p>
+          <a:p>
+            <a:pPr marL="0" indent="0">
+              <a:buNone/>
+            </a:pPr>
+            <a:r>
+              <a:rPr lang="en-US" sz="2800" dirty="0" smtClean="0">
+                <a:solidFill>
+                  <a:srgbClr val="000000"/>
+                </a:solidFill>
+                <a:latin typeface="Open Sans Cond Light"/>
+                <a:ea typeface="Lucida Grande"/>
+                <a:cs typeface="Open Sans Cond Light"/>
+              </a:rPr>
+              <a:t>β is the dial between optimality and constraint, or control and limitation.</a:t>
+            </a:r>
+          </a:p>
+          <a:p>
+            <a:pPr marL="0" indent="0">
+              <a:buNone/>
+            </a:pPr>
+            <a:endParaRPr lang="en-US" sz="2800" dirty="0" smtClean="0">
+              <a:solidFill>
+                <a:srgbClr val="000000"/>
+              </a:solidFill>
+              <a:latin typeface="Open Sans Cond Light"/>
+              <a:ea typeface="Lucida Grande"/>
+              <a:cs typeface="Open Sans Cond Light"/>
+            </a:endParaRPr>
+          </a:p>
+          <a:p>
+            <a:pPr marL="0" indent="0">
+              <a:buNone/>
+            </a:pPr>
+            <a:r>
+              <a:rPr lang="en-US" sz="2800" dirty="0" smtClean="0">
+                <a:solidFill>
+                  <a:srgbClr val="000000"/>
+                </a:solidFill>
+                <a:latin typeface="Open Sans Cond Light"/>
+                <a:ea typeface="Lucida Grande"/>
+                <a:cs typeface="Open Sans Cond Light"/>
+              </a:rPr>
+              <a:t>For cognitive tasks, β can be thought of as the index of perceived control (also interpreted as the index of rationality (</a:t>
+            </a:r>
+            <a:r>
+              <a:rPr lang="en-US" sz="2800" dirty="0" err="1" smtClean="0">
+                <a:solidFill>
+                  <a:srgbClr val="000000"/>
+                </a:solidFill>
+                <a:latin typeface="Open Sans Cond Light"/>
+                <a:ea typeface="Lucida Grande"/>
+                <a:cs typeface="Open Sans Cond Light"/>
+              </a:rPr>
+              <a:t>Wolpert</a:t>
+            </a:r>
+            <a:r>
+              <a:rPr lang="en-US" sz="2800" dirty="0" smtClean="0">
+                <a:solidFill>
+                  <a:srgbClr val="000000"/>
+                </a:solidFill>
+                <a:latin typeface="Open Sans Cond Light"/>
+                <a:ea typeface="Lucida Grande"/>
+                <a:cs typeface="Open Sans Cond Light"/>
+              </a:rPr>
+              <a:t>)), </a:t>
+            </a:r>
+            <a:r>
+              <a:rPr lang="en-US" sz="2800" dirty="0" smtClean="0">
+                <a:solidFill>
+                  <a:srgbClr val="000000"/>
+                </a:solidFill>
+                <a:latin typeface="Open Sans Cond Light"/>
+                <a:ea typeface="Lucida Grande"/>
+                <a:cs typeface="Open Sans Cond Light"/>
+              </a:rPr>
+              <a:t>Lagrangian multiplier</a:t>
+            </a:r>
+            <a:r>
+              <a:rPr lang="en-US" sz="2800" dirty="0" smtClean="0">
+                <a:solidFill>
+                  <a:srgbClr val="000000"/>
+                </a:solidFill>
+                <a:latin typeface="Open Sans Cond Light"/>
+                <a:cs typeface="Open Sans Cond Light"/>
+              </a:rPr>
+              <a:t>, resource parameter (Ortega, Braun), </a:t>
+            </a:r>
+            <a:r>
+              <a:rPr lang="en-US" sz="2800" dirty="0" smtClean="0">
+                <a:solidFill>
+                  <a:srgbClr val="000000"/>
+                </a:solidFill>
+                <a:latin typeface="Open Sans Cond Light"/>
+                <a:cs typeface="Open Sans Cond Light"/>
+              </a:rPr>
+              <a:t>QRE (</a:t>
+            </a:r>
+            <a:r>
+              <a:rPr lang="en-US" sz="2800" dirty="0" err="1" smtClean="0">
+                <a:solidFill>
+                  <a:srgbClr val="000000"/>
+                </a:solidFill>
+                <a:latin typeface="Open Sans Cond Light"/>
+                <a:cs typeface="Open Sans Cond Light"/>
+              </a:rPr>
+              <a:t>McKelvey</a:t>
+            </a:r>
+            <a:r>
+              <a:rPr lang="en-US" sz="2800" dirty="0" smtClean="0">
+                <a:solidFill>
+                  <a:srgbClr val="000000"/>
+                </a:solidFill>
+                <a:latin typeface="Open Sans Cond Light"/>
+                <a:cs typeface="Open Sans Cond Light"/>
+              </a:rPr>
+              <a:t>))</a:t>
+            </a:r>
+            <a:r>
+              <a:rPr lang="en-US" sz="2800" dirty="0" smtClean="0">
+                <a:solidFill>
+                  <a:srgbClr val="000000"/>
+                </a:solidFill>
+                <a:latin typeface="Open Sans Cond Light"/>
+                <a:cs typeface="Open Sans Cond Light"/>
+              </a:rPr>
+              <a:t>.</a:t>
+            </a:r>
+            <a:endParaRPr lang="en-US" sz="2800" dirty="0">
+              <a:solidFill>
+                <a:srgbClr val="000000"/>
+              </a:solidFill>
+              <a:latin typeface="Open Sans Cond Light"/>
+              <a:cs typeface="Open Sans Cond Light"/>
+            </a:endParaRPr>
+          </a:p>
+        </p:txBody>
+      </p:sp>
+    </p:spTree>
+    <p:extLst>
+      <p:ext uri="{BB962C8B-B14F-4D97-AF65-F5344CB8AC3E}">
+        <p14:creationId xmlns:p14="http://schemas.microsoft.com/office/powerpoint/2010/main" val="2128591191"/>
+      </p:ext>
+    </p:extLst>
+  </p:cSld>
+  <p:clrMapOvr>
+    <a:masterClrMapping/>
+  </p:clrMapOvr>
+</p:sld>
+</file>
+
+<file path=ppt/slides/slide2.xml><?xml version="1.0" encoding="utf-8"?>
+<p:sld xmlns:a="http://schemas.openxmlformats.org/drawingml/2006/main" xmlns:r="http://schemas.openxmlformats.org/officeDocument/2006/relationships" xmlns:p="http://schemas.openxmlformats.org/presentationml/2006/main">
+  <p:cSld>
+    <p:bg>
+      <p:bgPr>
+        <a:solidFill>
+          <a:srgbClr val="669933"/>
+        </a:solidFill>
+        <a:effectLst/>
+      </p:bgPr>
+    </p:bg>
+    <p:spTree>
+      <p:nvGrpSpPr>
+        <p:cNvPr id="1" name=""/>
+        <p:cNvGrpSpPr/>
+        <p:nvPr/>
+      </p:nvGrpSpPr>
+      <p:grpSpPr>
+        <a:xfrm>
+          <a:off x="0" y="0"/>
+          <a:ext cx="0" cy="0"/>
+          <a:chOff x="0" y="0"/>
+          <a:chExt cx="0" cy="0"/>
+        </a:xfrm>
+      </p:grpSpPr>
+      <p:sp>
+        <p:nvSpPr>
+          <p:cNvPr id="50" name="Title 1"/>
+          <p:cNvSpPr>
+            <a:spLocks noGrp="1"/>
+          </p:cNvSpPr>
+          <p:nvPr>
+            <p:ph type="title"/>
+          </p:nvPr>
+        </p:nvSpPr>
+        <p:spPr>
+          <a:xfrm>
             <a:off x="5170874" y="148600"/>
             <a:ext cx="3426443" cy="1143000"/>
           </a:xfrm>
@@ -4051,7 +4497,7 @@
       </p:sp>
       <p:pic>
         <p:nvPicPr>
-          <p:cNvPr id="4" name="Picture 3" descr="mu_distro.png"/>
+          <p:cNvPr id="51" name="Picture 50" descr="mu_distro.png"/>
           <p:cNvPicPr>
             <a:picLocks noChangeAspect="1"/>
           </p:cNvPicPr>
@@ -4081,7 +4527,7 @@
       </p:pic>
       <p:pic>
         <p:nvPicPr>
-          <p:cNvPr id="6" name="Picture 5" descr="tau_distro.png"/>
+          <p:cNvPr id="52" name="Picture 51" descr="tau_distro.png"/>
           <p:cNvPicPr>
             <a:picLocks noChangeAspect="1"/>
           </p:cNvPicPr>
@@ -4111,7 +4557,7 @@
       </p:pic>
       <p:pic>
         <p:nvPicPr>
-          <p:cNvPr id="7" name="Picture 6" descr="prior_data.png"/>
+          <p:cNvPr id="53" name="Picture 52" descr="prior_data.png"/>
           <p:cNvPicPr>
             <a:picLocks noChangeAspect="1"/>
           </p:cNvPicPr>
@@ -4141,7 +4587,7 @@
       </p:pic>
       <p:pic>
         <p:nvPicPr>
-          <p:cNvPr id="8" name="Picture 7" descr="data.png"/>
+          <p:cNvPr id="54" name="Picture 53" descr="data.png"/>
           <p:cNvPicPr>
             <a:picLocks noChangeAspect="1"/>
           </p:cNvPicPr>
@@ -4171,7 +4617,7 @@
       </p:pic>
       <p:sp>
         <p:nvSpPr>
-          <p:cNvPr id="10" name="Title 1"/>
+          <p:cNvPr id="55" name="Title 1"/>
           <p:cNvSpPr txBox="1">
             <a:spLocks/>
           </p:cNvSpPr>
@@ -4226,7 +4672,7 @@
       </p:sp>
       <p:sp>
         <p:nvSpPr>
-          <p:cNvPr id="11" name="Title 1"/>
+          <p:cNvPr id="56" name="Title 1"/>
           <p:cNvSpPr txBox="1">
             <a:spLocks/>
           </p:cNvSpPr>
@@ -4281,7 +4727,7 @@
       </p:sp>
       <p:sp>
         <p:nvSpPr>
-          <p:cNvPr id="14" name="Title 1"/>
+          <p:cNvPr id="57" name="Title 1"/>
           <p:cNvSpPr txBox="1">
             <a:spLocks/>
           </p:cNvSpPr>
@@ -4376,7 +4822,7 @@
       </p:sp>
       <p:sp>
         <p:nvSpPr>
-          <p:cNvPr id="15" name="Title 1"/>
+          <p:cNvPr id="58" name="Title 1"/>
           <p:cNvSpPr txBox="1">
             <a:spLocks/>
           </p:cNvSpPr>
@@ -4522,7 +4968,7 @@
       </p:sp>
       <p:sp>
         <p:nvSpPr>
-          <p:cNvPr id="18" name="Title 1"/>
+          <p:cNvPr id="59" name="Title 1"/>
           <p:cNvSpPr txBox="1">
             <a:spLocks/>
           </p:cNvSpPr>
@@ -4699,7 +5145,7 @@
       </p:sp>
       <p:sp>
         <p:nvSpPr>
-          <p:cNvPr id="19" name="Title 1"/>
+          <p:cNvPr id="60" name="Title 1"/>
           <p:cNvSpPr txBox="1">
             <a:spLocks/>
           </p:cNvSpPr>
@@ -4834,7 +5280,7 @@
       </p:sp>
       <p:sp>
         <p:nvSpPr>
-          <p:cNvPr id="20" name="Title 1"/>
+          <p:cNvPr id="61" name="Title 1"/>
           <p:cNvSpPr txBox="1">
             <a:spLocks/>
           </p:cNvSpPr>
@@ -4905,7 +5351,7 @@
       </p:sp>
       <p:pic>
         <p:nvPicPr>
-          <p:cNvPr id="21" name="Picture 20" descr="model.png"/>
+          <p:cNvPr id="62" name="Picture 61" descr="model.png"/>
           <p:cNvPicPr>
             <a:picLocks noChangeAspect="1"/>
           </p:cNvPicPr>
@@ -4936,13 +5382,20 @@
     </p:spTree>
     <p:extLst>
       <p:ext uri="{BB962C8B-B14F-4D97-AF65-F5344CB8AC3E}">
-        <p14:creationId xmlns:p14="http://schemas.microsoft.com/office/powerpoint/2010/main" val="2485764027"/>
+        <p14:creationId xmlns:p14="http://schemas.microsoft.com/office/powerpoint/2010/main" val="1901615667"/>
       </p:ext>
     </p:extLst>
   </p:cSld>
   <p:clrMapOvr>
     <a:masterClrMapping/>
   </p:clrMapOvr>
+  <p:timing>
+    <p:tnLst>
+      <p:par>
+        <p:cTn xmlns:p14="http://schemas.microsoft.com/office/powerpoint/2010/main" id="1" dur="indefinite" restart="never" nodeType="tmRoot"/>
+      </p:par>
+    </p:tnLst>
+  </p:timing>
 </p:sld>
 </file>
 
@@ -4971,90 +5424,6 @@
           <a:chExt cx="0" cy="0"/>
         </a:xfrm>
       </p:grpSpPr>
-      <p:sp>
-        <p:nvSpPr>
-          <p:cNvPr id="10" name="Rectangle 9"/>
-          <p:cNvSpPr/>
-          <p:nvPr/>
-        </p:nvSpPr>
-        <p:spPr>
-          <a:xfrm>
-            <a:off x="5558393" y="1996046"/>
-            <a:ext cx="3343472" cy="3486410"/>
-          </a:xfrm>
-          <a:prstGeom prst="rect">
-            <a:avLst/>
-          </a:prstGeom>
-          <a:solidFill>
-            <a:schemeClr val="tx1"/>
-          </a:solidFill>
-          <a:ln>
-            <a:noFill/>
-          </a:ln>
-          <a:effectLst/>
-        </p:spPr>
-        <p:style>
-          <a:lnRef idx="1">
-            <a:schemeClr val="accent1"/>
-          </a:lnRef>
-          <a:fillRef idx="3">
-            <a:schemeClr val="accent1"/>
-          </a:fillRef>
-          <a:effectRef idx="2">
-            <a:schemeClr val="accent1"/>
-          </a:effectRef>
-          <a:fontRef idx="minor">
-            <a:schemeClr val="lt1"/>
-          </a:fontRef>
-        </p:style>
-        <p:txBody>
-          <a:bodyPr rtlCol="0" anchor="ctr"/>
-          <a:lstStyle/>
-          <a:p>
-            <a:pPr algn="ctr"/>
-            <a:endParaRPr lang="en-US"/>
-          </a:p>
-        </p:txBody>
-      </p:sp>
-      <p:sp>
-        <p:nvSpPr>
-          <p:cNvPr id="11" name="Title 1"/>
-          <p:cNvSpPr>
-            <a:spLocks noGrp="1"/>
-          </p:cNvSpPr>
-          <p:nvPr>
-            <p:ph type="title"/>
-          </p:nvPr>
-        </p:nvSpPr>
-        <p:spPr>
-          <a:xfrm>
-            <a:off x="421869" y="277953"/>
-            <a:ext cx="4855572" cy="1143000"/>
-          </a:xfrm>
-        </p:spPr>
-        <p:txBody>
-          <a:bodyPr>
-            <a:noAutofit/>
-          </a:bodyPr>
-          <a:lstStyle/>
-          <a:p>
-            <a:pPr algn="l"/>
-            <a:r>
-              <a:rPr lang="en-US" sz="4000" dirty="0" smtClean="0">
-                <a:solidFill>
-                  <a:srgbClr val="FFFFFF"/>
-                </a:solidFill>
-              </a:rPr>
-              <a:t>Model functional forms</a:t>
-            </a:r>
-            <a:endParaRPr lang="en-US" sz="4000" dirty="0">
-              <a:solidFill>
-                <a:srgbClr val="FFFFFF"/>
-              </a:solidFill>
-            </a:endParaRPr>
-          </a:p>
-        </p:txBody>
-      </p:sp>
       <p:graphicFrame>
         <p:nvGraphicFramePr>
           <p:cNvPr id="12" name="Object 11"/>
@@ -5064,20 +5433,20 @@
           <p:nvPr>
             <p:extLst>
               <p:ext uri="{D42A27DB-BD31-4B8C-83A1-F6EECF244321}">
-                <p14:modId xmlns:p14="http://schemas.microsoft.com/office/powerpoint/2010/main" val="663030365"/>
+                <p14:modId xmlns:p14="http://schemas.microsoft.com/office/powerpoint/2010/main" val="3886535109"/>
               </p:ext>
             </p:extLst>
           </p:nvPr>
         </p:nvGraphicFramePr>
         <p:xfrm>
-          <a:off x="421869" y="1996045"/>
+          <a:off x="421243" y="1973280"/>
           <a:ext cx="11061700" cy="1236662"/>
         </p:xfrm>
         <a:graphic>
           <a:graphicData uri="http://schemas.openxmlformats.org/presentationml/2006/ole">
             <mc:AlternateContent xmlns:mc="http://schemas.openxmlformats.org/markup-compatibility/2006">
               <mc:Choice xmlns:v="urn:schemas-microsoft-com:vml" Requires="v">
-                <p:oleObj spid="_x0000_s6191" name="Document" r:id="rId4" imgW="5422900" imgH="609600" progId="Word.Document.12">
+                <p:oleObj spid="_x0000_s11277" name="Document" r:id="rId4" imgW="5422900" imgH="609600" progId="Word.Document.12">
                   <p:embed/>
                 </p:oleObj>
               </mc:Choice>
@@ -5098,238 +5467,8 @@
                     </p:blipFill>
                     <p:spPr>
                       <a:xfrm>
-                        <a:off x="421869" y="1996045"/>
+                        <a:off x="421243" y="1973280"/>
                         <a:ext cx="11061700" cy="1236662"/>
-                      </a:xfrm>
-                      <a:prstGeom prst="rect">
-                        <a:avLst/>
-                      </a:prstGeom>
-                    </p:spPr>
-                  </p:pic>
-                </p:oleObj>
-              </mc:Fallback>
-            </mc:AlternateContent>
-          </a:graphicData>
-        </a:graphic>
-      </p:graphicFrame>
-      <p:sp>
-        <p:nvSpPr>
-          <p:cNvPr id="13" name="TextBox 12"/>
-          <p:cNvSpPr txBox="1"/>
-          <p:nvPr/>
-        </p:nvSpPr>
-        <p:spPr>
-          <a:xfrm>
-            <a:off x="421869" y="1354020"/>
-            <a:ext cx="5150719" cy="461665"/>
-          </a:xfrm>
-          <a:prstGeom prst="rect">
-            <a:avLst/>
-          </a:prstGeom>
-          <a:noFill/>
-        </p:spPr>
-        <p:txBody>
-          <a:bodyPr wrap="none" rtlCol="0">
-            <a:spAutoFit/>
-          </a:bodyPr>
-          <a:lstStyle/>
-          <a:p>
-            <a:r>
-              <a:rPr lang="en-US" sz="2400" dirty="0" smtClean="0">
-                <a:solidFill>
-                  <a:schemeClr val="bg1"/>
-                </a:solidFill>
-                <a:latin typeface="Open Sans Cond Light"/>
-                <a:cs typeface="Open Sans Cond Light"/>
-              </a:rPr>
-              <a:t>Define a simple model with a Gaussian likelihood:</a:t>
-            </a:r>
-            <a:endParaRPr lang="en-US" sz="2400" dirty="0">
-              <a:solidFill>
-                <a:schemeClr val="bg1"/>
-              </a:solidFill>
-              <a:latin typeface="Open Sans Cond Light"/>
-              <a:cs typeface="Open Sans Cond Light"/>
-            </a:endParaRPr>
-          </a:p>
-        </p:txBody>
-      </p:sp>
-      <p:sp>
-        <p:nvSpPr>
-          <p:cNvPr id="14" name="TextBox 13"/>
-          <p:cNvSpPr txBox="1"/>
-          <p:nvPr/>
-        </p:nvSpPr>
-        <p:spPr>
-          <a:xfrm>
-            <a:off x="421869" y="2859228"/>
-            <a:ext cx="3331812" cy="1200328"/>
-          </a:xfrm>
-          <a:prstGeom prst="rect">
-            <a:avLst/>
-          </a:prstGeom>
-          <a:noFill/>
-        </p:spPr>
-        <p:txBody>
-          <a:bodyPr wrap="none" rtlCol="0">
-            <a:spAutoFit/>
-          </a:bodyPr>
-          <a:lstStyle/>
-          <a:p>
-            <a:r>
-              <a:rPr lang="en-US" sz="2400" dirty="0" smtClean="0">
-                <a:solidFill>
-                  <a:schemeClr val="bg1"/>
-                </a:solidFill>
-                <a:latin typeface="Open Sans Cond Light"/>
-                <a:cs typeface="Open Sans Cond Light"/>
-              </a:rPr>
-              <a:t>D = data</a:t>
-            </a:r>
-          </a:p>
-          <a:p>
-            <a:r>
-              <a:rPr lang="en-US" sz="2400" dirty="0" smtClean="0">
-                <a:solidFill>
-                  <a:schemeClr val="bg1"/>
-                </a:solidFill>
-                <a:latin typeface="Open Sans Cond Light"/>
-                <a:cs typeface="Open Sans Cond Light"/>
-              </a:rPr>
-              <a:t>μ = mean of Gaussian</a:t>
-            </a:r>
-          </a:p>
-          <a:p>
-            <a:r>
-              <a:rPr lang="en-US" sz="2400" dirty="0" err="1" smtClean="0">
-                <a:solidFill>
-                  <a:schemeClr val="bg1"/>
-                </a:solidFill>
-                <a:latin typeface="Open Sans Cond Light"/>
-                <a:cs typeface="Open Sans Cond Light"/>
-              </a:rPr>
-              <a:t>τ</a:t>
-            </a:r>
-            <a:r>
-              <a:rPr lang="en-US" sz="2400" dirty="0" smtClean="0">
-                <a:solidFill>
-                  <a:schemeClr val="bg1"/>
-                </a:solidFill>
-                <a:latin typeface="Open Sans Cond Light"/>
-                <a:cs typeface="Open Sans Cond Light"/>
-              </a:rPr>
-              <a:t>  = precision of Gaussian (1/σ</a:t>
-            </a:r>
-            <a:r>
-              <a:rPr lang="en-US" sz="2400" baseline="30000" dirty="0" smtClean="0">
-                <a:solidFill>
-                  <a:schemeClr val="bg1"/>
-                </a:solidFill>
-                <a:latin typeface="Open Sans Cond Light"/>
-                <a:cs typeface="Open Sans Cond Light"/>
-              </a:rPr>
-              <a:t>2</a:t>
-            </a:r>
-            <a:r>
-              <a:rPr lang="en-US" sz="2400" dirty="0" smtClean="0">
-                <a:solidFill>
-                  <a:schemeClr val="bg1"/>
-                </a:solidFill>
-                <a:latin typeface="Open Sans Cond Light"/>
-                <a:cs typeface="Open Sans Cond Light"/>
-              </a:rPr>
-              <a:t>)</a:t>
-            </a:r>
-          </a:p>
-        </p:txBody>
-      </p:sp>
-      <p:sp>
-        <p:nvSpPr>
-          <p:cNvPr id="15" name="TextBox 14"/>
-          <p:cNvSpPr txBox="1"/>
-          <p:nvPr/>
-        </p:nvSpPr>
-        <p:spPr>
-          <a:xfrm>
-            <a:off x="421869" y="4237964"/>
-            <a:ext cx="3122820" cy="461665"/>
-          </a:xfrm>
-          <a:prstGeom prst="rect">
-            <a:avLst/>
-          </a:prstGeom>
-          <a:noFill/>
-        </p:spPr>
-        <p:txBody>
-          <a:bodyPr wrap="none" rtlCol="0">
-            <a:spAutoFit/>
-          </a:bodyPr>
-          <a:lstStyle/>
-          <a:p>
-            <a:r>
-              <a:rPr lang="en-US" sz="2400" dirty="0" smtClean="0">
-                <a:solidFill>
-                  <a:schemeClr val="bg1"/>
-                </a:solidFill>
-                <a:latin typeface="Open Sans Cond Light"/>
-                <a:cs typeface="Open Sans Cond Light"/>
-              </a:rPr>
-              <a:t>The corresponding priors are:</a:t>
-            </a:r>
-            <a:endParaRPr lang="en-US" sz="2400" dirty="0">
-              <a:solidFill>
-                <a:schemeClr val="bg1"/>
-              </a:solidFill>
-              <a:latin typeface="Open Sans Cond Light"/>
-              <a:cs typeface="Open Sans Cond Light"/>
-            </a:endParaRPr>
-          </a:p>
-        </p:txBody>
-      </p:sp>
-      <p:graphicFrame>
-        <p:nvGraphicFramePr>
-          <p:cNvPr id="16" name="Object 15"/>
-          <p:cNvGraphicFramePr>
-            <a:graphicFrameLocks noChangeAspect="1"/>
-          </p:cNvGraphicFramePr>
-          <p:nvPr>
-            <p:extLst>
-              <p:ext uri="{D42A27DB-BD31-4B8C-83A1-F6EECF244321}">
-                <p14:modId xmlns:p14="http://schemas.microsoft.com/office/powerpoint/2010/main" val="3140843220"/>
-              </p:ext>
-            </p:extLst>
-          </p:nvPr>
-        </p:nvGraphicFramePr>
-        <p:xfrm>
-          <a:off x="421243" y="4865505"/>
-          <a:ext cx="11061700" cy="952500"/>
-        </p:xfrm>
-        <a:graphic>
-          <a:graphicData uri="http://schemas.openxmlformats.org/presentationml/2006/ole">
-            <mc:AlternateContent xmlns:mc="http://schemas.openxmlformats.org/markup-compatibility/2006">
-              <mc:Choice xmlns:v="urn:schemas-microsoft-com:vml" Requires="v">
-                <p:oleObj spid="_x0000_s6192" name="Document" r:id="rId6" imgW="5422900" imgH="469900" progId="Word.Document.12">
-                  <p:embed/>
-                </p:oleObj>
-              </mc:Choice>
-              <mc:Fallback>
-                <p:oleObj name="Document" r:id="rId6" imgW="5422900" imgH="469900" progId="Word.Document.12">
-                  <p:embed/>
-                  <p:pic>
-                    <p:nvPicPr>
-                      <p:cNvPr id="0" name=""/>
-                      <p:cNvPicPr/>
-                      <p:nvPr/>
-                    </p:nvPicPr>
-                    <p:blipFill>
-                      <a:blip r:embed="rId7"/>
-                      <a:stretch>
-                        <a:fillRect/>
-                      </a:stretch>
-                    </p:blipFill>
-                    <p:spPr>
-                      <a:xfrm>
-                        <a:off x="421243" y="4865505"/>
-                        <a:ext cx="11061700" cy="952500"/>
                       </a:xfrm>
                       <a:prstGeom prst="rect">
                         <a:avLst/>
@@ -5351,25 +5490,294 @@
           <p:nvPr>
             <p:extLst>
               <p:ext uri="{D42A27DB-BD31-4B8C-83A1-F6EECF244321}">
-                <p14:modId xmlns:p14="http://schemas.microsoft.com/office/powerpoint/2010/main" val="2903574707"/>
+                <p14:modId xmlns:p14="http://schemas.microsoft.com/office/powerpoint/2010/main" val="2356150076"/>
               </p:ext>
             </p:extLst>
           </p:nvPr>
         </p:nvGraphicFramePr>
         <p:xfrm>
-          <a:off x="424418" y="5792732"/>
+          <a:off x="418068" y="5769967"/>
           <a:ext cx="11061700" cy="1001712"/>
         </p:xfrm>
         <a:graphic>
           <a:graphicData uri="http://schemas.openxmlformats.org/presentationml/2006/ole">
             <mc:AlternateContent xmlns:mc="http://schemas.openxmlformats.org/markup-compatibility/2006">
               <mc:Choice xmlns:v="urn:schemas-microsoft-com:vml" Requires="v">
-                <p:oleObj spid="_x0000_s6193" name="Document" r:id="rId8" imgW="5422900" imgH="495300" progId="Word.Document.12">
+                <p:oleObj spid="_x0000_s11278" name="Document" r:id="rId6" imgW="5422900" imgH="495300" progId="Word.Document.12">
                   <p:embed/>
                 </p:oleObj>
               </mc:Choice>
               <mc:Fallback>
-                <p:oleObj name="Document" r:id="rId8" imgW="5422900" imgH="495300" progId="Word.Document.12">
+                <p:oleObj name="Document" r:id="rId6" imgW="5422900" imgH="495300" progId="Word.Document.12">
+                  <p:embed/>
+                  <p:pic>
+                    <p:nvPicPr>
+                      <p:cNvPr id="0" name=""/>
+                      <p:cNvPicPr/>
+                      <p:nvPr/>
+                    </p:nvPicPr>
+                    <p:blipFill>
+                      <a:blip r:embed="rId7"/>
+                      <a:stretch>
+                        <a:fillRect/>
+                      </a:stretch>
+                    </p:blipFill>
+                    <p:spPr>
+                      <a:xfrm>
+                        <a:off x="418068" y="5769967"/>
+                        <a:ext cx="11061700" cy="1001712"/>
+                      </a:xfrm>
+                      <a:prstGeom prst="rect">
+                        <a:avLst/>
+                      </a:prstGeom>
+                    </p:spPr>
+                  </p:pic>
+                </p:oleObj>
+              </mc:Fallback>
+            </mc:AlternateContent>
+          </a:graphicData>
+        </a:graphic>
+      </p:graphicFrame>
+      <p:sp>
+        <p:nvSpPr>
+          <p:cNvPr id="11" name="Title 1"/>
+          <p:cNvSpPr>
+            <a:spLocks noGrp="1"/>
+          </p:cNvSpPr>
+          <p:nvPr>
+            <p:ph type="title"/>
+          </p:nvPr>
+        </p:nvSpPr>
+        <p:spPr>
+          <a:xfrm>
+            <a:off x="421869" y="277953"/>
+            <a:ext cx="4855572" cy="1143000"/>
+          </a:xfrm>
+        </p:spPr>
+        <p:txBody>
+          <a:bodyPr>
+            <a:noAutofit/>
+          </a:bodyPr>
+          <a:lstStyle/>
+          <a:p>
+            <a:pPr algn="l"/>
+            <a:r>
+              <a:rPr lang="en-US" sz="4000" dirty="0" smtClean="0">
+                <a:solidFill>
+                  <a:srgbClr val="FFFFFF"/>
+                </a:solidFill>
+              </a:rPr>
+              <a:t>Functional form</a:t>
+            </a:r>
+            <a:endParaRPr lang="en-US" sz="4000" dirty="0">
+              <a:solidFill>
+                <a:srgbClr val="FFFFFF"/>
+              </a:solidFill>
+            </a:endParaRPr>
+          </a:p>
+        </p:txBody>
+      </p:sp>
+      <p:sp>
+        <p:nvSpPr>
+          <p:cNvPr id="13" name="TextBox 12"/>
+          <p:cNvSpPr txBox="1"/>
+          <p:nvPr/>
+        </p:nvSpPr>
+        <p:spPr>
+          <a:xfrm>
+            <a:off x="418694" y="1331255"/>
+            <a:ext cx="5150719" cy="461665"/>
+          </a:xfrm>
+          <a:prstGeom prst="rect">
+            <a:avLst/>
+          </a:prstGeom>
+          <a:noFill/>
+        </p:spPr>
+        <p:txBody>
+          <a:bodyPr wrap="none" rtlCol="0">
+            <a:spAutoFit/>
+          </a:bodyPr>
+          <a:lstStyle/>
+          <a:p>
+            <a:r>
+              <a:rPr lang="en-US" sz="2400" dirty="0" smtClean="0">
+                <a:solidFill>
+                  <a:schemeClr val="bg1"/>
+                </a:solidFill>
+                <a:latin typeface="Open Sans Cond Light"/>
+                <a:cs typeface="Open Sans Cond Light"/>
+              </a:rPr>
+              <a:t>Define a simple model with a Gaussian likelihood:</a:t>
+            </a:r>
+            <a:endParaRPr lang="en-US" sz="2400" dirty="0">
+              <a:solidFill>
+                <a:schemeClr val="bg1"/>
+              </a:solidFill>
+              <a:latin typeface="Open Sans Cond Light"/>
+              <a:cs typeface="Open Sans Cond Light"/>
+            </a:endParaRPr>
+          </a:p>
+        </p:txBody>
+      </p:sp>
+      <p:sp>
+        <p:nvSpPr>
+          <p:cNvPr id="14" name="TextBox 13"/>
+          <p:cNvSpPr txBox="1"/>
+          <p:nvPr/>
+        </p:nvSpPr>
+        <p:spPr>
+          <a:xfrm>
+            <a:off x="418694" y="2836463"/>
+            <a:ext cx="3331812" cy="1200328"/>
+          </a:xfrm>
+          <a:prstGeom prst="rect">
+            <a:avLst/>
+          </a:prstGeom>
+          <a:noFill/>
+        </p:spPr>
+        <p:txBody>
+          <a:bodyPr wrap="none" rtlCol="0">
+            <a:spAutoFit/>
+          </a:bodyPr>
+          <a:lstStyle/>
+          <a:p>
+            <a:r>
+              <a:rPr lang="en-US" sz="2400" dirty="0" smtClean="0">
+                <a:solidFill>
+                  <a:schemeClr val="bg1"/>
+                </a:solidFill>
+                <a:latin typeface="Open Sans Cond Light"/>
+                <a:cs typeface="Open Sans Cond Light"/>
+              </a:rPr>
+              <a:t>D = data</a:t>
+            </a:r>
+          </a:p>
+          <a:p>
+            <a:r>
+              <a:rPr lang="en-US" sz="2400" dirty="0" smtClean="0">
+                <a:solidFill>
+                  <a:schemeClr val="bg1"/>
+                </a:solidFill>
+                <a:latin typeface="Open Sans Cond Light"/>
+                <a:cs typeface="Open Sans Cond Light"/>
+              </a:rPr>
+              <a:t>μ = mean of Gaussian</a:t>
+            </a:r>
+          </a:p>
+          <a:p>
+            <a:r>
+              <a:rPr lang="en-US" sz="2400" dirty="0" err="1" smtClean="0">
+                <a:solidFill>
+                  <a:schemeClr val="bg1"/>
+                </a:solidFill>
+                <a:latin typeface="Open Sans Cond Light"/>
+                <a:cs typeface="Open Sans Cond Light"/>
+              </a:rPr>
+              <a:t>τ</a:t>
+            </a:r>
+            <a:r>
+              <a:rPr lang="en-US" sz="2400" dirty="0" smtClean="0">
+                <a:solidFill>
+                  <a:schemeClr val="bg1"/>
+                </a:solidFill>
+                <a:latin typeface="Open Sans Cond Light"/>
+                <a:cs typeface="Open Sans Cond Light"/>
+              </a:rPr>
+              <a:t>  = precision of Gaussian (1/σ</a:t>
+            </a:r>
+            <a:r>
+              <a:rPr lang="en-US" sz="2400" baseline="30000" dirty="0" smtClean="0">
+                <a:solidFill>
+                  <a:schemeClr val="bg1"/>
+                </a:solidFill>
+                <a:latin typeface="Open Sans Cond Light"/>
+                <a:cs typeface="Open Sans Cond Light"/>
+              </a:rPr>
+              <a:t>2</a:t>
+            </a:r>
+            <a:r>
+              <a:rPr lang="en-US" sz="2400" dirty="0" smtClean="0">
+                <a:solidFill>
+                  <a:schemeClr val="bg1"/>
+                </a:solidFill>
+                <a:latin typeface="Open Sans Cond Light"/>
+                <a:cs typeface="Open Sans Cond Light"/>
+              </a:rPr>
+              <a:t>)</a:t>
+            </a:r>
+          </a:p>
+        </p:txBody>
+      </p:sp>
+      <p:sp>
+        <p:nvSpPr>
+          <p:cNvPr id="15" name="TextBox 14"/>
+          <p:cNvSpPr txBox="1"/>
+          <p:nvPr/>
+        </p:nvSpPr>
+        <p:spPr>
+          <a:xfrm>
+            <a:off x="418694" y="4215199"/>
+            <a:ext cx="3122820" cy="461665"/>
+          </a:xfrm>
+          <a:prstGeom prst="rect">
+            <a:avLst/>
+          </a:prstGeom>
+          <a:noFill/>
+        </p:spPr>
+        <p:txBody>
+          <a:bodyPr wrap="none" rtlCol="0">
+            <a:spAutoFit/>
+          </a:bodyPr>
+          <a:lstStyle/>
+          <a:p>
+            <a:r>
+              <a:rPr lang="en-US" sz="2400" dirty="0" smtClean="0">
+                <a:solidFill>
+                  <a:schemeClr val="bg1"/>
+                </a:solidFill>
+                <a:latin typeface="Open Sans Cond Light"/>
+                <a:cs typeface="Open Sans Cond Light"/>
+              </a:rPr>
+              <a:t>The corresponding priors are:</a:t>
+            </a:r>
+            <a:endParaRPr lang="en-US" sz="2400" dirty="0">
+              <a:solidFill>
+                <a:schemeClr val="bg1"/>
+              </a:solidFill>
+              <a:latin typeface="Open Sans Cond Light"/>
+              <a:cs typeface="Open Sans Cond Light"/>
+            </a:endParaRPr>
+          </a:p>
+        </p:txBody>
+      </p:sp>
+      <p:graphicFrame>
+        <p:nvGraphicFramePr>
+          <p:cNvPr id="16" name="Object 15"/>
+          <p:cNvGraphicFramePr>
+            <a:graphicFrameLocks noChangeAspect="1"/>
+          </p:cNvGraphicFramePr>
+          <p:nvPr>
+            <p:extLst>
+              <p:ext uri="{D42A27DB-BD31-4B8C-83A1-F6EECF244321}">
+                <p14:modId xmlns:p14="http://schemas.microsoft.com/office/powerpoint/2010/main" val="1556821230"/>
+              </p:ext>
+            </p:extLst>
+          </p:nvPr>
+        </p:nvGraphicFramePr>
+        <p:xfrm>
+          <a:off x="418068" y="4842740"/>
+          <a:ext cx="11061700" cy="952500"/>
+        </p:xfrm>
+        <a:graphic>
+          <a:graphicData uri="http://schemas.openxmlformats.org/presentationml/2006/ole">
+            <mc:AlternateContent xmlns:mc="http://schemas.openxmlformats.org/markup-compatibility/2006">
+              <mc:Choice xmlns:v="urn:schemas-microsoft-com:vml" Requires="v">
+                <p:oleObj spid="_x0000_s11279" name="Document" r:id="rId8" imgW="5422900" imgH="469900" progId="Word.Document.12">
+                  <p:embed/>
+                </p:oleObj>
+              </mc:Choice>
+              <mc:Fallback>
+                <p:oleObj name="Document" r:id="rId8" imgW="5422900" imgH="469900" progId="Word.Document.12">
                   <p:embed/>
                   <p:pic>
                     <p:nvPicPr>
@@ -5385,8 +5793,8 @@
                     </p:blipFill>
                     <p:spPr>
                       <a:xfrm>
-                        <a:off x="424418" y="5792732"/>
-                        <a:ext cx="11061700" cy="1001712"/>
+                        <a:off x="418068" y="4842740"/>
+                        <a:ext cx="11061700" cy="952500"/>
                       </a:xfrm>
                       <a:prstGeom prst="rect">
                         <a:avLst/>
@@ -5407,8 +5815,8 @@
         </p:nvSpPr>
         <p:spPr>
           <a:xfrm>
-            <a:off x="6579766" y="3397920"/>
-            <a:ext cx="1334762" cy="1334762"/>
+            <a:off x="5691860" y="3669219"/>
+            <a:ext cx="944314" cy="944314"/>
           </a:xfrm>
           <a:prstGeom prst="ellipse">
             <a:avLst/>
@@ -5462,8 +5870,8 @@
         </p:nvSpPr>
         <p:spPr>
           <a:xfrm>
-            <a:off x="6134400" y="3140676"/>
-            <a:ext cx="2233271" cy="2064578"/>
+            <a:off x="5376333" y="3243921"/>
+            <a:ext cx="1565042" cy="1878413"/>
           </a:xfrm>
           <a:prstGeom prst="roundRect">
             <a:avLst/>
@@ -5507,7 +5915,7 @@
         </p:nvSpPr>
         <p:spPr>
           <a:xfrm>
-            <a:off x="7810252" y="4551222"/>
+            <a:off x="6441976" y="4613533"/>
             <a:ext cx="388396" cy="369332"/>
           </a:xfrm>
           <a:prstGeom prst="rect">
@@ -5545,7 +5953,7 @@
         </p:nvSpPr>
         <p:spPr>
           <a:xfrm>
-            <a:off x="6262088" y="2177645"/>
+            <a:off x="7119271" y="3766452"/>
             <a:ext cx="749848" cy="749848"/>
           </a:xfrm>
           <a:prstGeom prst="ellipse">
@@ -5600,7 +6008,7 @@
         </p:nvSpPr>
         <p:spPr>
           <a:xfrm>
-            <a:off x="7524080" y="2163839"/>
+            <a:off x="7116863" y="2163839"/>
             <a:ext cx="749848" cy="749848"/>
           </a:xfrm>
           <a:prstGeom prst="ellipse">
@@ -5647,19 +6055,157 @@
           </a:p>
         </p:txBody>
       </p:sp>
+      <p:sp>
+        <p:nvSpPr>
+          <p:cNvPr id="27" name="TextBox 26"/>
+          <p:cNvSpPr txBox="1"/>
+          <p:nvPr/>
+        </p:nvSpPr>
+        <p:spPr>
+          <a:xfrm>
+            <a:off x="7305427" y="1116569"/>
+            <a:ext cx="563692" cy="369332"/>
+          </a:xfrm>
+          <a:prstGeom prst="rect">
+            <a:avLst/>
+          </a:prstGeom>
+          <a:noFill/>
+        </p:spPr>
+        <p:txBody>
+          <a:bodyPr wrap="square" rtlCol="0">
+            <a:spAutoFit/>
+          </a:bodyPr>
+          <a:lstStyle/>
+          <a:p>
+            <a:r>
+              <a:rPr lang="en-US" dirty="0" smtClean="0">
+                <a:solidFill>
+                  <a:schemeClr val="bg1"/>
+                </a:solidFill>
+              </a:rPr>
+              <a:t>a</a:t>
+            </a:r>
+            <a:r>
+              <a:rPr lang="en-US" baseline="-25000" dirty="0" smtClean="0">
+                <a:solidFill>
+                  <a:schemeClr val="bg1"/>
+                </a:solidFill>
+              </a:rPr>
+              <a:t>0</a:t>
+            </a:r>
+            <a:endParaRPr lang="en-US" dirty="0">
+              <a:solidFill>
+                <a:schemeClr val="bg1"/>
+              </a:solidFill>
+            </a:endParaRPr>
+          </a:p>
+        </p:txBody>
+      </p:sp>
+      <p:sp>
+        <p:nvSpPr>
+          <p:cNvPr id="28" name="TextBox 27"/>
+          <p:cNvSpPr txBox="1"/>
+          <p:nvPr/>
+        </p:nvSpPr>
+        <p:spPr>
+          <a:xfrm>
+            <a:off x="8499955" y="2314916"/>
+            <a:ext cx="563692" cy="369332"/>
+          </a:xfrm>
+          <a:prstGeom prst="rect">
+            <a:avLst/>
+          </a:prstGeom>
+          <a:noFill/>
+        </p:spPr>
+        <p:txBody>
+          <a:bodyPr wrap="square" rtlCol="0">
+            <a:spAutoFit/>
+          </a:bodyPr>
+          <a:lstStyle/>
+          <a:p>
+            <a:r>
+              <a:rPr lang="en-US" dirty="0">
+                <a:solidFill>
+                  <a:schemeClr val="bg1"/>
+                </a:solidFill>
+              </a:rPr>
+              <a:t>b</a:t>
+            </a:r>
+            <a:r>
+              <a:rPr lang="en-US" baseline="-25000" dirty="0" smtClean="0">
+                <a:solidFill>
+                  <a:schemeClr val="bg1"/>
+                </a:solidFill>
+              </a:rPr>
+              <a:t>0</a:t>
+            </a:r>
+            <a:endParaRPr lang="en-US" dirty="0">
+              <a:solidFill>
+                <a:schemeClr val="bg1"/>
+              </a:solidFill>
+            </a:endParaRPr>
+          </a:p>
+        </p:txBody>
+      </p:sp>
+      <p:sp>
+        <p:nvSpPr>
+          <p:cNvPr id="34" name="TextBox 33"/>
+          <p:cNvSpPr txBox="1"/>
+          <p:nvPr/>
+        </p:nvSpPr>
+        <p:spPr>
+          <a:xfrm>
+            <a:off x="7327022" y="5052090"/>
+            <a:ext cx="402683" cy="369332"/>
+          </a:xfrm>
+          <a:prstGeom prst="rect">
+            <a:avLst/>
+          </a:prstGeom>
+          <a:noFill/>
+        </p:spPr>
+        <p:txBody>
+          <a:bodyPr wrap="square" rtlCol="0">
+            <a:spAutoFit/>
+          </a:bodyPr>
+          <a:lstStyle/>
+          <a:p>
+            <a:r>
+              <a:rPr lang="en-US" dirty="0" smtClean="0">
+                <a:solidFill>
+                  <a:schemeClr val="bg1"/>
+                </a:solidFill>
+              </a:rPr>
+              <a:t>τ</a:t>
+            </a:r>
+            <a:r>
+              <a:rPr lang="en-US" baseline="-25000" dirty="0" smtClean="0">
+                <a:solidFill>
+                  <a:schemeClr val="bg1"/>
+                </a:solidFill>
+              </a:rPr>
+              <a:t>0</a:t>
+            </a:r>
+            <a:endParaRPr lang="en-US" dirty="0">
+              <a:solidFill>
+                <a:schemeClr val="bg1"/>
+              </a:solidFill>
+            </a:endParaRPr>
+          </a:p>
+        </p:txBody>
+      </p:sp>
       <p:cxnSp>
         <p:nvCxnSpPr>
-          <p:cNvPr id="23" name="Straight Connector 22"/>
+          <p:cNvPr id="53" name="Straight Connector 52"/>
           <p:cNvCxnSpPr>
-            <a:stCxn id="22" idx="6"/>
-            <a:endCxn id="24" idx="3"/>
+            <a:stCxn id="22" idx="0"/>
+            <a:endCxn id="55" idx="4"/>
           </p:cNvCxnSpPr>
           <p:nvPr/>
         </p:nvCxnSpPr>
         <p:spPr>
           <a:xfrm flipV="1">
-            <a:off x="8273928" y="2329526"/>
-            <a:ext cx="156615" cy="209237"/>
+            <a:off x="7491787" y="1562088"/>
+            <a:ext cx="2408" cy="601751"/>
           </a:xfrm>
           <a:prstGeom prst="line">
             <a:avLst/>
@@ -5686,16 +6232,54 @@
           </a:fontRef>
         </p:style>
       </p:cxnSp>
-      <p:sp>
-        <p:nvSpPr>
-          <p:cNvPr id="24" name="Oval 23"/>
+      <p:cxnSp>
+        <p:nvCxnSpPr>
+          <p:cNvPr id="54" name="Straight Connector 53"/>
+          <p:cNvCxnSpPr>
+            <a:stCxn id="22" idx="6"/>
+          </p:cNvCxnSpPr>
+          <p:nvPr/>
+        </p:nvCxnSpPr>
+        <p:spPr>
+          <a:xfrm>
+            <a:off x="7866711" y="2538763"/>
+            <a:ext cx="585445" cy="0"/>
+          </a:xfrm>
+          <a:prstGeom prst="line">
+            <a:avLst/>
+          </a:prstGeom>
+          <a:ln>
+            <a:solidFill>
+              <a:schemeClr val="bg1"/>
+            </a:solidFill>
+          </a:ln>
+          <a:effectLst/>
+        </p:spPr>
+        <p:style>
+          <a:lnRef idx="2">
+            <a:schemeClr val="accent1"/>
+          </a:lnRef>
+          <a:fillRef idx="0">
+            <a:schemeClr val="accent1"/>
+          </a:fillRef>
+          <a:effectRef idx="1">
+            <a:schemeClr val="accent1"/>
+          </a:effectRef>
+          <a:fontRef idx="minor">
+            <a:schemeClr val="tx1"/>
+          </a:fontRef>
+        </p:style>
+      </p:cxnSp>
+      <p:sp>
+        <p:nvSpPr>
+          <p:cNvPr id="55" name="Oval 54"/>
           <p:cNvSpPr/>
           <p:nvPr/>
         </p:nvSpPr>
         <p:spPr>
           <a:xfrm>
-            <a:off x="8408757" y="2202545"/>
-            <a:ext cx="148767" cy="148767"/>
+            <a:off x="7462433" y="1498565"/>
+            <a:ext cx="63523" cy="63523"/>
           </a:xfrm>
           <a:prstGeom prst="ellipse">
             <a:avLst/>
@@ -5733,55 +6317,16 @@
           </a:p>
         </p:txBody>
       </p:sp>
-      <p:cxnSp>
-        <p:nvCxnSpPr>
-          <p:cNvPr id="25" name="Straight Connector 24"/>
-          <p:cNvCxnSpPr>
-            <a:stCxn id="22" idx="6"/>
-            <a:endCxn id="26" idx="2"/>
-          </p:cNvCxnSpPr>
+      <p:sp>
+        <p:nvSpPr>
+          <p:cNvPr id="56" name="Oval 55"/>
+          <p:cNvSpPr/>
           <p:nvPr/>
-        </p:nvCxnSpPr>
+        </p:nvSpPr>
         <p:spPr>
           <a:xfrm>
-            <a:off x="8273928" y="2538763"/>
-            <a:ext cx="107805" cy="66980"/>
-          </a:xfrm>
-          <a:prstGeom prst="line">
-            <a:avLst/>
-          </a:prstGeom>
-          <a:ln>
-            <a:solidFill>
-              <a:schemeClr val="bg1"/>
-            </a:solidFill>
-          </a:ln>
-          <a:effectLst/>
-        </p:spPr>
-        <p:style>
-          <a:lnRef idx="2">
-            <a:schemeClr val="accent1"/>
-          </a:lnRef>
-          <a:fillRef idx="0">
-            <a:schemeClr val="accent1"/>
-          </a:fillRef>
-          <a:effectRef idx="1">
-            <a:schemeClr val="accent1"/>
-          </a:effectRef>
-          <a:fontRef idx="minor">
-            <a:schemeClr val="tx1"/>
-          </a:fontRef>
-        </p:style>
-      </p:cxnSp>
-      <p:sp>
-        <p:nvSpPr>
-          <p:cNvPr id="26" name="Oval 25"/>
-          <p:cNvSpPr/>
-          <p:nvPr/>
-        </p:nvSpPr>
-        <p:spPr>
-          <a:xfrm>
-            <a:off x="8381733" y="2531359"/>
-            <a:ext cx="148767" cy="148767"/>
+            <a:off x="8436432" y="2499582"/>
+            <a:ext cx="63523" cy="63523"/>
           </a:xfrm>
           <a:prstGeom prst="ellipse">
             <a:avLst/>
@@ -5819,110 +6364,136 @@
           </a:p>
         </p:txBody>
       </p:sp>
-      <p:sp>
-        <p:nvSpPr>
-          <p:cNvPr id="27" name="TextBox 26"/>
-          <p:cNvSpPr txBox="1"/>
-          <p:nvPr/>
-        </p:nvSpPr>
-        <p:spPr>
-          <a:xfrm>
-            <a:off x="8512037" y="2012420"/>
-            <a:ext cx="563692" cy="369332"/>
-          </a:xfrm>
-          <a:prstGeom prst="rect">
-            <a:avLst/>
-          </a:prstGeom>
-          <a:noFill/>
-        </p:spPr>
-        <p:txBody>
-          <a:bodyPr wrap="square" rtlCol="0">
-            <a:spAutoFit/>
-          </a:bodyPr>
-          <a:lstStyle/>
-          <a:p>
-            <a:r>
-              <a:rPr lang="en-US" dirty="0" smtClean="0">
-                <a:solidFill>
-                  <a:schemeClr val="bg1"/>
-                </a:solidFill>
-              </a:rPr>
-              <a:t>a</a:t>
-            </a:r>
-            <a:r>
-              <a:rPr lang="en-US" baseline="-25000" dirty="0" smtClean="0">
-                <a:solidFill>
-                  <a:schemeClr val="bg1"/>
-                </a:solidFill>
-              </a:rPr>
-              <a:t>0</a:t>
-            </a:r>
-            <a:endParaRPr lang="en-US" dirty="0">
-              <a:solidFill>
-                <a:schemeClr val="bg1"/>
-              </a:solidFill>
-            </a:endParaRPr>
-          </a:p>
-        </p:txBody>
-      </p:sp>
-      <p:sp>
-        <p:nvSpPr>
-          <p:cNvPr id="28" name="TextBox 27"/>
-          <p:cNvSpPr txBox="1"/>
-          <p:nvPr/>
-        </p:nvSpPr>
-        <p:spPr>
-          <a:xfrm>
-            <a:off x="8519034" y="2392107"/>
-            <a:ext cx="563692" cy="369332"/>
-          </a:xfrm>
-          <a:prstGeom prst="rect">
-            <a:avLst/>
-          </a:prstGeom>
-          <a:noFill/>
-        </p:spPr>
-        <p:txBody>
-          <a:bodyPr wrap="square" rtlCol="0">
-            <a:spAutoFit/>
-          </a:bodyPr>
-          <a:lstStyle/>
-          <a:p>
-            <a:r>
-              <a:rPr lang="en-US" dirty="0">
-                <a:solidFill>
-                  <a:schemeClr val="bg1"/>
-                </a:solidFill>
-              </a:rPr>
-              <a:t>b</a:t>
-            </a:r>
-            <a:r>
-              <a:rPr lang="en-US" baseline="-25000" dirty="0" smtClean="0">
-                <a:solidFill>
-                  <a:schemeClr val="bg1"/>
-                </a:solidFill>
-              </a:rPr>
-              <a:t>0</a:t>
-            </a:r>
-            <a:endParaRPr lang="en-US" dirty="0">
-              <a:solidFill>
-                <a:schemeClr val="bg1"/>
-              </a:solidFill>
-            </a:endParaRPr>
-          </a:p>
-        </p:txBody>
-      </p:sp>
       <p:cxnSp>
         <p:nvCxnSpPr>
-          <p:cNvPr id="29" name="Straight Connector 28"/>
+          <p:cNvPr id="58" name="Straight Arrow Connector 57"/>
           <p:cNvCxnSpPr>
             <a:stCxn id="21" idx="2"/>
+            <a:endCxn id="18" idx="6"/>
           </p:cNvCxnSpPr>
           <p:nvPr/>
         </p:nvCxnSpPr>
         <p:spPr>
-          <a:xfrm flipH="1" flipV="1">
-            <a:off x="6004632" y="2341189"/>
-            <a:ext cx="257456" cy="211380"/>
+          <a:xfrm flipH="1">
+            <a:off x="6636174" y="4141376"/>
+            <a:ext cx="483097" cy="0"/>
+          </a:xfrm>
+          <a:prstGeom prst="straightConnector1">
+            <a:avLst/>
+          </a:prstGeom>
+          <a:ln w="28575" cmpd="sng">
+            <a:solidFill>
+              <a:schemeClr val="bg1"/>
+            </a:solidFill>
+            <a:tailEnd type="arrow"/>
+          </a:ln>
+          <a:effectLst/>
+        </p:spPr>
+        <p:style>
+          <a:lnRef idx="2">
+            <a:schemeClr val="accent1"/>
+          </a:lnRef>
+          <a:fillRef idx="0">
+            <a:schemeClr val="accent1"/>
+          </a:fillRef>
+          <a:effectRef idx="1">
+            <a:schemeClr val="accent1"/>
+          </a:effectRef>
+          <a:fontRef idx="minor">
+            <a:schemeClr val="tx1"/>
+          </a:fontRef>
+        </p:style>
+      </p:cxnSp>
+      <p:cxnSp>
+        <p:nvCxnSpPr>
+          <p:cNvPr id="60" name="Straight Arrow Connector 59"/>
+          <p:cNvCxnSpPr>
+            <a:stCxn id="22" idx="4"/>
+            <a:endCxn id="21" idx="0"/>
+          </p:cNvCxnSpPr>
+          <p:nvPr/>
+        </p:nvCxnSpPr>
+        <p:spPr>
+          <a:xfrm>
+            <a:off x="7491787" y="2913687"/>
+            <a:ext cx="2408" cy="852765"/>
+          </a:xfrm>
+          <a:prstGeom prst="straightConnector1">
+            <a:avLst/>
+          </a:prstGeom>
+          <a:ln w="28575" cmpd="sng">
+            <a:solidFill>
+              <a:schemeClr val="bg1"/>
+            </a:solidFill>
+            <a:tailEnd type="arrow"/>
+          </a:ln>
+          <a:effectLst/>
+        </p:spPr>
+        <p:style>
+          <a:lnRef idx="2">
+            <a:schemeClr val="accent1"/>
+          </a:lnRef>
+          <a:fillRef idx="0">
+            <a:schemeClr val="accent1"/>
+          </a:fillRef>
+          <a:effectRef idx="1">
+            <a:schemeClr val="accent1"/>
+          </a:effectRef>
+          <a:fontRef idx="minor">
+            <a:schemeClr val="tx1"/>
+          </a:fontRef>
+        </p:style>
+      </p:cxnSp>
+      <p:cxnSp>
+        <p:nvCxnSpPr>
+          <p:cNvPr id="62" name="Straight Arrow Connector 61"/>
+          <p:cNvCxnSpPr>
+            <a:stCxn id="22" idx="3"/>
+            <a:endCxn id="18" idx="0"/>
+          </p:cNvCxnSpPr>
+          <p:nvPr/>
+        </p:nvCxnSpPr>
+        <p:spPr>
+          <a:xfrm flipH="1">
+            <a:off x="6164017" y="2803874"/>
+            <a:ext cx="1062659" cy="865345"/>
+          </a:xfrm>
+          <a:prstGeom prst="straightConnector1">
+            <a:avLst/>
+          </a:prstGeom>
+          <a:ln w="28575" cmpd="sng">
+            <a:solidFill>
+              <a:schemeClr val="bg1"/>
+            </a:solidFill>
+            <a:tailEnd type="arrow"/>
+          </a:ln>
+          <a:effectLst/>
+        </p:spPr>
+        <p:style>
+          <a:lnRef idx="2">
+            <a:schemeClr val="accent1"/>
+          </a:lnRef>
+          <a:fillRef idx="0">
+            <a:schemeClr val="accent1"/>
+          </a:fillRef>
+          <a:effectRef idx="1">
+            <a:schemeClr val="accent1"/>
+          </a:effectRef>
+          <a:fontRef idx="minor">
+            <a:schemeClr val="tx1"/>
+          </a:fontRef>
+        </p:style>
+      </p:cxnSp>
+      <p:cxnSp>
+        <p:nvCxnSpPr>
+          <p:cNvPr id="94" name="Straight Connector 93"/>
+          <p:cNvCxnSpPr/>
+          <p:nvPr/>
+        </p:nvCxnSpPr>
+        <p:spPr>
+          <a:xfrm>
+            <a:off x="7866711" y="4141376"/>
+            <a:ext cx="585445" cy="0"/>
           </a:xfrm>
           <a:prstGeom prst="line">
             <a:avLst/>
@@ -5951,14 +6522,14 @@
       </p:cxnSp>
       <p:sp>
         <p:nvSpPr>
-          <p:cNvPr id="30" name="Oval 29"/>
+          <p:cNvPr id="95" name="Oval 94"/>
           <p:cNvSpPr/>
           <p:nvPr/>
         </p:nvSpPr>
         <p:spPr>
           <a:xfrm>
-            <a:off x="5886874" y="2266068"/>
-            <a:ext cx="148767" cy="148767"/>
+            <a:off x="8428806" y="4109614"/>
+            <a:ext cx="63523" cy="63523"/>
           </a:xfrm>
           <a:prstGeom prst="ellipse">
             <a:avLst/>
@@ -5998,14 +6569,14 @@
       </p:sp>
       <p:sp>
         <p:nvSpPr>
-          <p:cNvPr id="31" name="TextBox 30"/>
+          <p:cNvPr id="96" name="TextBox 95"/>
           <p:cNvSpPr txBox="1"/>
           <p:nvPr/>
         </p:nvSpPr>
         <p:spPr>
           <a:xfrm>
-            <a:off x="5543818" y="2114810"/>
-            <a:ext cx="563692" cy="369332"/>
+            <a:off x="8499955" y="3956710"/>
+            <a:ext cx="460814" cy="369332"/>
           </a:xfrm>
           <a:prstGeom prst="rect">
             <a:avLst/>
@@ -6042,220 +6613,108 @@
           </a:p>
         </p:txBody>
       </p:sp>
-      <p:cxnSp>
-        <p:nvCxnSpPr>
-          <p:cNvPr id="32" name="Straight Connector 31"/>
-          <p:cNvCxnSpPr>
-            <a:stCxn id="21" idx="2"/>
-            <a:endCxn id="33" idx="3"/>
-          </p:cNvCxnSpPr>
+      <p:grpSp>
+        <p:nvGrpSpPr>
+          <p:cNvPr id="101" name="Group 100"/>
+          <p:cNvGrpSpPr/>
           <p:nvPr/>
-        </p:nvCxnSpPr>
-        <p:spPr>
-          <a:xfrm flipH="1">
-            <a:off x="5908660" y="2552569"/>
-            <a:ext cx="353428" cy="119577"/>
+        </p:nvGrpSpPr>
+        <p:grpSpPr>
+          <a:xfrm>
+            <a:off x="7456862" y="4516300"/>
+            <a:ext cx="63523" cy="644145"/>
+            <a:chOff x="7494962" y="4516300"/>
+            <a:chExt cx="63523" cy="644145"/>
           </a:xfrm>
-          <a:prstGeom prst="line">
-            <a:avLst/>
-          </a:prstGeom>
-          <a:ln>
+        </p:grpSpPr>
+        <p:sp>
+          <p:nvSpPr>
+            <p:cNvPr id="98" name="Oval 97"/>
+            <p:cNvSpPr/>
+            <p:nvPr/>
+          </p:nvSpPr>
+          <p:spPr>
+            <a:xfrm>
+              <a:off x="7494962" y="5096922"/>
+              <a:ext cx="63523" cy="63523"/>
+            </a:xfrm>
+            <a:prstGeom prst="ellipse">
+              <a:avLst/>
+            </a:prstGeom>
             <a:solidFill>
               <a:schemeClr val="bg1"/>
             </a:solidFill>
-          </a:ln>
-          <a:effectLst/>
-        </p:spPr>
-        <p:style>
-          <a:lnRef idx="2">
-            <a:schemeClr val="accent1"/>
-          </a:lnRef>
-          <a:fillRef idx="0">
-            <a:schemeClr val="accent1"/>
-          </a:fillRef>
-          <a:effectRef idx="1">
-            <a:schemeClr val="accent1"/>
-          </a:effectRef>
-          <a:fontRef idx="minor">
-            <a:schemeClr val="tx1"/>
-          </a:fontRef>
-        </p:style>
-      </p:cxnSp>
-      <p:sp>
-        <p:nvSpPr>
-          <p:cNvPr id="33" name="Oval 32"/>
-          <p:cNvSpPr/>
-          <p:nvPr/>
-        </p:nvSpPr>
-        <p:spPr>
-          <a:xfrm>
-            <a:off x="5886874" y="2545165"/>
-            <a:ext cx="148767" cy="148767"/>
-          </a:xfrm>
-          <a:prstGeom prst="ellipse">
-            <a:avLst/>
-          </a:prstGeom>
-          <a:solidFill>
-            <a:schemeClr val="bg1"/>
-          </a:solidFill>
-          <a:ln>
-            <a:solidFill>
-              <a:schemeClr val="bg1"/>
-            </a:solidFill>
-          </a:ln>
-          <a:effectLst/>
-        </p:spPr>
-        <p:style>
-          <a:lnRef idx="1">
-            <a:schemeClr val="accent1"/>
-          </a:lnRef>
-          <a:fillRef idx="3">
-            <a:schemeClr val="accent1"/>
-          </a:fillRef>
-          <a:effectRef idx="2">
-            <a:schemeClr val="accent1"/>
-          </a:effectRef>
-          <a:fontRef idx="minor">
-            <a:schemeClr val="lt1"/>
-          </a:fontRef>
-        </p:style>
-        <p:txBody>
-          <a:bodyPr rtlCol="0" anchor="ctr"/>
-          <a:lstStyle/>
-          <a:p>
-            <a:pPr algn="ctr"/>
-            <a:endParaRPr lang="en-US"/>
-          </a:p>
-        </p:txBody>
-      </p:sp>
-      <p:sp>
-        <p:nvSpPr>
-          <p:cNvPr id="34" name="TextBox 33"/>
-          <p:cNvSpPr txBox="1"/>
-          <p:nvPr/>
-        </p:nvSpPr>
-        <p:spPr>
-          <a:xfrm>
-            <a:off x="5587506" y="2396994"/>
-            <a:ext cx="563692" cy="369332"/>
-          </a:xfrm>
-          <a:prstGeom prst="rect">
-            <a:avLst/>
-          </a:prstGeom>
-          <a:noFill/>
-        </p:spPr>
-        <p:txBody>
-          <a:bodyPr wrap="square" rtlCol="0">
-            <a:spAutoFit/>
-          </a:bodyPr>
-          <a:lstStyle/>
-          <a:p>
-            <a:r>
-              <a:rPr lang="en-US" dirty="0" smtClean="0">
-                <a:solidFill>
-                  <a:schemeClr val="bg1"/>
-                </a:solidFill>
-              </a:rPr>
-              <a:t>τ</a:t>
-            </a:r>
-            <a:r>
-              <a:rPr lang="en-US" baseline="-25000" dirty="0" smtClean="0">
-                <a:solidFill>
-                  <a:schemeClr val="bg1"/>
-                </a:solidFill>
-              </a:rPr>
-              <a:t>0</a:t>
-            </a:r>
-            <a:endParaRPr lang="en-US" dirty="0">
+            <a:ln>
               <a:solidFill>
                 <a:schemeClr val="bg1"/>
               </a:solidFill>
-            </a:endParaRPr>
-          </a:p>
-        </p:txBody>
-      </p:sp>
-      <p:cxnSp>
-        <p:nvCxnSpPr>
-          <p:cNvPr id="35" name="Straight Connector 34"/>
-          <p:cNvCxnSpPr>
-            <a:stCxn id="21" idx="4"/>
-            <a:endCxn id="18" idx="0"/>
-          </p:cNvCxnSpPr>
-          <p:nvPr/>
-        </p:nvCxnSpPr>
-        <p:spPr>
-          <a:xfrm>
-            <a:off x="6637012" y="2927493"/>
-            <a:ext cx="610135" cy="470427"/>
-          </a:xfrm>
-          <a:prstGeom prst="line">
-            <a:avLst/>
-          </a:prstGeom>
-          <a:ln w="28575" cmpd="sng">
-            <a:solidFill>
-              <a:schemeClr val="bg1"/>
-            </a:solidFill>
-          </a:ln>
-          <a:effectLst/>
-        </p:spPr>
-        <p:style>
-          <a:lnRef idx="2">
-            <a:schemeClr val="accent1"/>
-          </a:lnRef>
-          <a:fillRef idx="0">
-            <a:schemeClr val="accent1"/>
-          </a:fillRef>
-          <a:effectRef idx="1">
-            <a:schemeClr val="accent1"/>
-          </a:effectRef>
-          <a:fontRef idx="minor">
-            <a:schemeClr val="tx1"/>
-          </a:fontRef>
-        </p:style>
-      </p:cxnSp>
-      <p:cxnSp>
-        <p:nvCxnSpPr>
-          <p:cNvPr id="36" name="Straight Connector 35"/>
-          <p:cNvCxnSpPr>
-            <a:stCxn id="22" idx="4"/>
-            <a:endCxn id="18" idx="0"/>
-          </p:cNvCxnSpPr>
-          <p:nvPr/>
-        </p:nvCxnSpPr>
-        <p:spPr>
-          <a:xfrm flipH="1">
-            <a:off x="7247147" y="2913687"/>
-            <a:ext cx="651857" cy="484233"/>
-          </a:xfrm>
-          <a:prstGeom prst="line">
-            <a:avLst/>
-          </a:prstGeom>
-          <a:ln w="28575" cmpd="sng">
-            <a:solidFill>
-              <a:schemeClr val="bg1"/>
-            </a:solidFill>
-          </a:ln>
-          <a:effectLst/>
-        </p:spPr>
-        <p:style>
-          <a:lnRef idx="2">
-            <a:schemeClr val="accent1"/>
-          </a:lnRef>
-          <a:fillRef idx="0">
-            <a:schemeClr val="accent1"/>
-          </a:fillRef>
-          <a:effectRef idx="1">
-            <a:schemeClr val="accent1"/>
-          </a:effectRef>
-          <a:fontRef idx="minor">
-            <a:schemeClr val="tx1"/>
-          </a:fontRef>
-        </p:style>
-      </p:cxnSp>
+            </a:ln>
+            <a:effectLst/>
+          </p:spPr>
+          <p:style>
+            <a:lnRef idx="1">
+              <a:schemeClr val="accent1"/>
+            </a:lnRef>
+            <a:fillRef idx="3">
+              <a:schemeClr val="accent1"/>
+            </a:fillRef>
+            <a:effectRef idx="2">
+              <a:schemeClr val="accent1"/>
+            </a:effectRef>
+            <a:fontRef idx="minor">
+              <a:schemeClr val="lt1"/>
+            </a:fontRef>
+          </p:style>
+          <p:txBody>
+            <a:bodyPr rtlCol="0" anchor="ctr"/>
+            <a:lstStyle/>
+            <a:p>
+              <a:pPr algn="ctr"/>
+              <a:endParaRPr lang="en-US"/>
+            </a:p>
+          </p:txBody>
+        </p:sp>
+        <p:cxnSp>
+          <p:nvCxnSpPr>
+            <p:cNvPr id="100" name="Straight Connector 99"/>
+            <p:cNvCxnSpPr/>
+            <p:nvPr/>
+          </p:nvCxnSpPr>
+          <p:spPr>
+            <a:xfrm flipV="1">
+              <a:off x="7528364" y="4516300"/>
+              <a:ext cx="2408" cy="601751"/>
+            </a:xfrm>
+            <a:prstGeom prst="line">
+              <a:avLst/>
+            </a:prstGeom>
+            <a:ln>
+              <a:solidFill>
+                <a:schemeClr val="bg1"/>
+              </a:solidFill>
+            </a:ln>
+            <a:effectLst/>
+          </p:spPr>
+          <p:style>
+            <a:lnRef idx="2">
+              <a:schemeClr val="accent1"/>
+            </a:lnRef>
+            <a:fillRef idx="0">
+              <a:schemeClr val="accent1"/>
+            </a:fillRef>
+            <a:effectRef idx="1">
+              <a:schemeClr val="accent1"/>
+            </a:effectRef>
+            <a:fontRef idx="minor">
+              <a:schemeClr val="tx1"/>
+            </a:fontRef>
+          </p:style>
+        </p:cxnSp>
+      </p:grpSp>
     </p:spTree>
     <p:extLst>
       <p:ext uri="{BB962C8B-B14F-4D97-AF65-F5344CB8AC3E}">
-        <p14:creationId xmlns:p14="http://schemas.microsoft.com/office/powerpoint/2010/main" val="1901615667"/>
+        <p14:creationId xmlns:p14="http://schemas.microsoft.com/office/powerpoint/2010/main" val="2424199955"/>
       </p:ext>
     </p:extLst>
   </p:cSld>
@@ -6361,7 +6820,7 @@
           <a:graphicData uri="http://schemas.openxmlformats.org/presentationml/2006/ole">
             <mc:AlternateContent xmlns:mc="http://schemas.openxmlformats.org/markup-compatibility/2006">
               <mc:Choice xmlns:v="urn:schemas-microsoft-com:vml" Requires="v">
-                <p:oleObj spid="_x0000_s1087" name="Document" r:id="rId4" imgW="5422900" imgH="1409700" progId="Word.Document.12">
+                <p:oleObj spid="_x0000_s1092" name="Document" r:id="rId4" imgW="5422900" imgH="1409700" progId="Word.Document.12">
                   <p:embed/>
                 </p:oleObj>
               </mc:Choice>
@@ -6418,7 +6877,7 @@
           <a:graphicData uri="http://schemas.openxmlformats.org/presentationml/2006/ole">
             <mc:AlternateContent xmlns:mc="http://schemas.openxmlformats.org/markup-compatibility/2006">
               <mc:Choice xmlns:v="urn:schemas-microsoft-com:vml" Requires="v">
-                <p:oleObj spid="_x0000_s1088" name="Document" r:id="rId6" imgW="5422900" imgH="495300" progId="Word.Document.12">
+                <p:oleObj spid="_x0000_s1093" name="Document" r:id="rId6" imgW="5422900" imgH="495300" progId="Word.Document.12">
                   <p:embed/>
                 </p:oleObj>
               </mc:Choice>
@@ -6556,7 +7015,7 @@
     <p:bg>
       <p:bgPr>
         <a:solidFill>
-          <a:srgbClr val="9966CC"/>
+          <a:srgbClr val="6666FF"/>
         </a:solidFill>
         <a:effectLst/>
       </p:bgPr>
@@ -6577,7 +7036,7 @@
       </p:grpSpPr>
       <p:sp>
         <p:nvSpPr>
-          <p:cNvPr id="2" name="Title 1"/>
+          <p:cNvPr id="11" name="Title 1"/>
           <p:cNvSpPr>
             <a:spLocks noGrp="1"/>
           </p:cNvSpPr>
@@ -6616,14 +7075,14 @@
       </p:sp>
       <p:graphicFrame>
         <p:nvGraphicFramePr>
-          <p:cNvPr id="5" name="Object 4"/>
+          <p:cNvPr id="13" name="Object 12"/>
           <p:cNvGraphicFramePr>
             <a:graphicFrameLocks noChangeAspect="1"/>
           </p:cNvGraphicFramePr>
           <p:nvPr>
             <p:extLst>
               <p:ext uri="{D42A27DB-BD31-4B8C-83A1-F6EECF244321}">
-                <p14:modId xmlns:p14="http://schemas.microsoft.com/office/powerpoint/2010/main" val="4284620689"/>
+                <p14:modId xmlns:p14="http://schemas.microsoft.com/office/powerpoint/2010/main" val="3319672709"/>
               </p:ext>
             </p:extLst>
           </p:nvPr>
@@ -6636,7 +7095,7 @@
           <a:graphicData uri="http://schemas.openxmlformats.org/presentationml/2006/ole">
             <mc:AlternateContent xmlns:mc="http://schemas.openxmlformats.org/markup-compatibility/2006">
               <mc:Choice xmlns:v="urn:schemas-microsoft-com:vml" Requires="v">
-                <p:oleObj spid="_x0000_s7224" name="Document" r:id="rId3" imgW="5422900" imgH="698500" progId="Word.Document.12">
+                <p:oleObj spid="_x0000_s8286" name="Document" r:id="rId3" imgW="5422900" imgH="698500" progId="Word.Document.12">
                   <p:embed/>
                 </p:oleObj>
               </mc:Choice>
@@ -6673,14 +7132,14 @@
       </p:graphicFrame>
       <p:graphicFrame>
         <p:nvGraphicFramePr>
-          <p:cNvPr id="6" name="Object 5"/>
+          <p:cNvPr id="14" name="Object 13"/>
           <p:cNvGraphicFramePr>
             <a:graphicFrameLocks noChangeAspect="1"/>
           </p:cNvGraphicFramePr>
           <p:nvPr>
             <p:extLst>
               <p:ext uri="{D42A27DB-BD31-4B8C-83A1-F6EECF244321}">
-                <p14:modId xmlns:p14="http://schemas.microsoft.com/office/powerpoint/2010/main" val="2066337747"/>
+                <p14:modId xmlns:p14="http://schemas.microsoft.com/office/powerpoint/2010/main" val="1711195142"/>
               </p:ext>
             </p:extLst>
           </p:nvPr>
@@ -6693,7 +7152,7 @@
           <a:graphicData uri="http://schemas.openxmlformats.org/presentationml/2006/ole">
             <mc:AlternateContent xmlns:mc="http://schemas.openxmlformats.org/markup-compatibility/2006">
               <mc:Choice xmlns:v="urn:schemas-microsoft-com:vml" Requires="v">
-                <p:oleObj spid="_x0000_s7225" name="Document" r:id="rId5" imgW="5422900" imgH="698500" progId="Word.Document.12">
+                <p:oleObj spid="_x0000_s8287" name="Document" r:id="rId5" imgW="5422900" imgH="698500" progId="Word.Document.12">
                   <p:embed/>
                 </p:oleObj>
               </mc:Choice>
@@ -6730,14 +7189,14 @@
       </p:graphicFrame>
       <p:graphicFrame>
         <p:nvGraphicFramePr>
-          <p:cNvPr id="9" name="Object 8"/>
+          <p:cNvPr id="15" name="Object 14"/>
           <p:cNvGraphicFramePr>
             <a:graphicFrameLocks noChangeAspect="1"/>
           </p:cNvGraphicFramePr>
           <p:nvPr>
             <p:extLst>
               <p:ext uri="{D42A27DB-BD31-4B8C-83A1-F6EECF244321}">
-                <p14:modId xmlns:p14="http://schemas.microsoft.com/office/powerpoint/2010/main" val="2261080486"/>
+                <p14:modId xmlns:p14="http://schemas.microsoft.com/office/powerpoint/2010/main" val="868221894"/>
               </p:ext>
             </p:extLst>
           </p:nvPr>
@@ -6750,7 +7209,7 @@
           <a:graphicData uri="http://schemas.openxmlformats.org/presentationml/2006/ole">
             <mc:AlternateContent xmlns:mc="http://schemas.openxmlformats.org/markup-compatibility/2006">
               <mc:Choice xmlns:v="urn:schemas-microsoft-com:vml" Requires="v">
-                <p:oleObj spid="_x0000_s7226" name="Document" r:id="rId7" imgW="5422900" imgH="698500" progId="Word.Document.12">
+                <p:oleObj spid="_x0000_s8288" name="Document" r:id="rId7" imgW="5422900" imgH="698500" progId="Word.Document.12">
                   <p:embed/>
                 </p:oleObj>
               </mc:Choice>
@@ -6787,14 +7246,14 @@
       </p:graphicFrame>
       <p:graphicFrame>
         <p:nvGraphicFramePr>
-          <p:cNvPr id="10" name="Object 9"/>
+          <p:cNvPr id="16" name="Object 15"/>
           <p:cNvGraphicFramePr>
             <a:graphicFrameLocks noChangeAspect="1"/>
           </p:cNvGraphicFramePr>
           <p:nvPr>
             <p:extLst>
               <p:ext uri="{D42A27DB-BD31-4B8C-83A1-F6EECF244321}">
-                <p14:modId xmlns:p14="http://schemas.microsoft.com/office/powerpoint/2010/main" val="3883505325"/>
+                <p14:modId xmlns:p14="http://schemas.microsoft.com/office/powerpoint/2010/main" val="2974992820"/>
               </p:ext>
             </p:extLst>
           </p:nvPr>
@@ -6807,7 +7266,7 @@
           <a:graphicData uri="http://schemas.openxmlformats.org/presentationml/2006/ole">
             <mc:AlternateContent xmlns:mc="http://schemas.openxmlformats.org/markup-compatibility/2006">
               <mc:Choice xmlns:v="urn:schemas-microsoft-com:vml" Requires="v">
-                <p:oleObj spid="_x0000_s7227" name="Document" r:id="rId9" imgW="5422900" imgH="800100" progId="Word.Document.12">
+                <p:oleObj spid="_x0000_s8289" name="Document" r:id="rId9" imgW="5422900" imgH="800100" progId="Word.Document.12">
                   <p:embed/>
                 </p:oleObj>
               </mc:Choice>
@@ -6842,86 +7301,70 @@
           </a:graphicData>
         </a:graphic>
       </p:graphicFrame>
-      <p:sp>
-        <p:nvSpPr>
-          <p:cNvPr id="11" name="TextBox 10"/>
-          <p:cNvSpPr txBox="1"/>
+      <p:pic>
+        <p:nvPicPr>
+          <p:cNvPr id="5" name="Picture 4" descr="T1.png"/>
+          <p:cNvPicPr>
+            <a:picLocks noChangeAspect="1"/>
+          </p:cNvPicPr>
           <p:nvPr/>
-        </p:nvSpPr>
+        </p:nvPicPr>
+        <p:blipFill>
+          <a:blip r:embed="rId11">
+            <a:extLst>
+              <a:ext uri="{28A0092B-C50C-407E-A947-70E740481C1C}">
+                <a14:useLocalDpi xmlns:a14="http://schemas.microsoft.com/office/drawing/2010/main" val="0"/>
+              </a:ext>
+            </a:extLst>
+          </a:blip>
+          <a:stretch>
+            <a:fillRect/>
+          </a:stretch>
+        </p:blipFill>
         <p:spPr>
           <a:xfrm>
-            <a:off x="1587549" y="3498953"/>
-            <a:ext cx="3243135" cy="369332"/>
+            <a:off x="0" y="3252705"/>
+            <a:ext cx="9144000" cy="487831"/>
           </a:xfrm>
           <a:prstGeom prst="rect">
             <a:avLst/>
           </a:prstGeom>
-          <a:noFill/>
         </p:spPr>
-        <p:txBody>
-          <a:bodyPr wrap="square" rtlCol="0">
-            <a:spAutoFit/>
-          </a:bodyPr>
-          <a:lstStyle/>
-          <a:p>
-            <a:r>
-              <a:rPr lang="en-US" dirty="0" smtClean="0"/>
-              <a:t>Add the </a:t>
-            </a:r>
-            <a:r>
-              <a:rPr lang="en-US" dirty="0" err="1" smtClean="0"/>
-              <a:t>matlab</a:t>
-            </a:r>
-            <a:r>
-              <a:rPr lang="en-US" dirty="0" smtClean="0"/>
-              <a:t> code here</a:t>
-            </a:r>
-            <a:endParaRPr lang="en-US" dirty="0"/>
-          </a:p>
-        </p:txBody>
-      </p:sp>
-      <p:sp>
-        <p:nvSpPr>
-          <p:cNvPr id="12" name="TextBox 11"/>
-          <p:cNvSpPr txBox="1"/>
+      </p:pic>
+      <p:pic>
+        <p:nvPicPr>
+          <p:cNvPr id="17" name="Picture 16" descr="T2.png"/>
+          <p:cNvPicPr>
+            <a:picLocks noChangeAspect="1"/>
+          </p:cNvPicPr>
           <p:nvPr/>
-        </p:nvSpPr>
+        </p:nvPicPr>
+        <p:blipFill>
+          <a:blip r:embed="rId12">
+            <a:extLst>
+              <a:ext uri="{28A0092B-C50C-407E-A947-70E740481C1C}">
+                <a14:useLocalDpi xmlns:a14="http://schemas.microsoft.com/office/drawing/2010/main" val="0"/>
+              </a:ext>
+            </a:extLst>
+          </a:blip>
+          <a:stretch>
+            <a:fillRect/>
+          </a:stretch>
+        </p:blipFill>
         <p:spPr>
           <a:xfrm>
-            <a:off x="1678267" y="6233215"/>
-            <a:ext cx="3243135" cy="369332"/>
+            <a:off x="0" y="6302564"/>
+            <a:ext cx="9144000" cy="440557"/>
           </a:xfrm>
           <a:prstGeom prst="rect">
             <a:avLst/>
           </a:prstGeom>
-          <a:noFill/>
         </p:spPr>
-        <p:txBody>
-          <a:bodyPr wrap="square" rtlCol="0">
-            <a:spAutoFit/>
-          </a:bodyPr>
-          <a:lstStyle/>
-          <a:p>
-            <a:r>
-              <a:rPr lang="en-US" dirty="0" smtClean="0"/>
-              <a:t>Add the </a:t>
-            </a:r>
-            <a:r>
-              <a:rPr lang="en-US" dirty="0" err="1" smtClean="0"/>
-              <a:t>matlab</a:t>
-            </a:r>
-            <a:r>
-              <a:rPr lang="en-US" dirty="0" smtClean="0"/>
-              <a:t> code here</a:t>
-            </a:r>
-            <a:endParaRPr lang="en-US" dirty="0"/>
-          </a:p>
-        </p:txBody>
-      </p:sp>
+      </p:pic>
     </p:spTree>
     <p:extLst>
       <p:ext uri="{BB962C8B-B14F-4D97-AF65-F5344CB8AC3E}">
-        <p14:creationId xmlns:p14="http://schemas.microsoft.com/office/powerpoint/2010/main" val="1097740780"/>
+        <p14:creationId xmlns:p14="http://schemas.microsoft.com/office/powerpoint/2010/main" val="3722760400"/>
       </p:ext>
     </p:extLst>
   </p:cSld>
@@ -7004,7 +7447,7 @@
           <p:nvPr>
             <p:extLst>
               <p:ext uri="{D42A27DB-BD31-4B8C-83A1-F6EECF244321}">
-                <p14:modId xmlns:p14="http://schemas.microsoft.com/office/powerpoint/2010/main" val="449289257"/>
+                <p14:modId xmlns:p14="http://schemas.microsoft.com/office/powerpoint/2010/main" val="238407194"/>
               </p:ext>
             </p:extLst>
           </p:nvPr>
@@ -7017,7 +7460,7 @@
           <a:graphicData uri="http://schemas.openxmlformats.org/presentationml/2006/ole">
             <mc:AlternateContent xmlns:mc="http://schemas.openxmlformats.org/markup-compatibility/2006">
               <mc:Choice xmlns:v="urn:schemas-microsoft-com:vml" Requires="v">
-                <p:oleObj spid="_x0000_s8269" name="Document" r:id="rId3" imgW="5422900" imgH="698500" progId="Word.Document.12">
+                <p:oleObj spid="_x0000_s10247" name="Document" r:id="rId3" imgW="5422900" imgH="698500" progId="Word.Document.12">
                   <p:embed/>
                 </p:oleObj>
               </mc:Choice>
@@ -7061,7 +7504,7 @@
           <p:nvPr>
             <p:extLst>
               <p:ext uri="{D42A27DB-BD31-4B8C-83A1-F6EECF244321}">
-                <p14:modId xmlns:p14="http://schemas.microsoft.com/office/powerpoint/2010/main" val="1919875747"/>
+                <p14:modId xmlns:p14="http://schemas.microsoft.com/office/powerpoint/2010/main" val="787757472"/>
               </p:ext>
             </p:extLst>
           </p:nvPr>
@@ -7074,7 +7517,7 @@
           <a:graphicData uri="http://schemas.openxmlformats.org/presentationml/2006/ole">
             <mc:AlternateContent xmlns:mc="http://schemas.openxmlformats.org/markup-compatibility/2006">
               <mc:Choice xmlns:v="urn:schemas-microsoft-com:vml" Requires="v">
-                <p:oleObj spid="_x0000_s8270" name="Document" r:id="rId5" imgW="5422900" imgH="698500" progId="Word.Document.12">
+                <p:oleObj spid="_x0000_s10248" name="Document" r:id="rId5" imgW="5422900" imgH="698500" progId="Word.Document.12">
                   <p:embed/>
                 </p:oleObj>
               </mc:Choice>
@@ -7109,86 +7552,88 @@
           </a:graphicData>
         </a:graphic>
       </p:graphicFrame>
+      <p:pic>
+        <p:nvPicPr>
+          <p:cNvPr id="3" name="Picture 2" descr="T3.png"/>
+          <p:cNvPicPr>
+            <a:picLocks noChangeAspect="1"/>
+          </p:cNvPicPr>
+          <p:nvPr/>
+        </p:nvPicPr>
+        <p:blipFill rotWithShape="1">
+          <a:blip r:embed="rId7">
+            <a:extLst>
+              <a:ext uri="{28A0092B-C50C-407E-A947-70E740481C1C}">
+                <a14:useLocalDpi xmlns:a14="http://schemas.microsoft.com/office/drawing/2010/main" val="0"/>
+              </a:ext>
+            </a:extLst>
+          </a:blip>
+          <a:srcRect/>
+          <a:stretch/>
+        </p:blipFill>
+        <p:spPr>
+          <a:xfrm>
+            <a:off x="622300" y="3246455"/>
+            <a:ext cx="7899400" cy="673100"/>
+          </a:xfrm>
+          <a:prstGeom prst="rect">
+            <a:avLst/>
+          </a:prstGeom>
+        </p:spPr>
+      </p:pic>
+      <p:pic>
+        <p:nvPicPr>
+          <p:cNvPr id="5" name="Picture 4" descr="T4.png"/>
+          <p:cNvPicPr>
+            <a:picLocks noChangeAspect="1"/>
+          </p:cNvPicPr>
+          <p:nvPr/>
+        </p:nvPicPr>
+        <p:blipFill>
+          <a:blip r:embed="rId8">
+            <a:extLst>
+              <a:ext uri="{28A0092B-C50C-407E-A947-70E740481C1C}">
+                <a14:useLocalDpi xmlns:a14="http://schemas.microsoft.com/office/drawing/2010/main" val="0"/>
+              </a:ext>
+            </a:extLst>
+          </a:blip>
+          <a:stretch>
+            <a:fillRect/>
+          </a:stretch>
+        </p:blipFill>
+        <p:spPr>
+          <a:xfrm>
+            <a:off x="3086100" y="5783703"/>
+            <a:ext cx="2971800" cy="533400"/>
+          </a:xfrm>
+          <a:prstGeom prst="rect">
+            <a:avLst/>
+          </a:prstGeom>
+        </p:spPr>
+      </p:pic>
       <p:graphicFrame>
         <p:nvGraphicFramePr>
-          <p:cNvPr id="8" name="Object 7"/>
+          <p:cNvPr id="13" name="Object 12"/>
           <p:cNvGraphicFramePr>
             <a:graphicFrameLocks noChangeAspect="1"/>
           </p:cNvGraphicFramePr>
           <p:nvPr>
             <p:extLst>
               <p:ext uri="{D42A27DB-BD31-4B8C-83A1-F6EECF244321}">
-                <p14:modId xmlns:p14="http://schemas.microsoft.com/office/powerpoint/2010/main" val="3094699718"/>
+                <p14:modId xmlns:p14="http://schemas.microsoft.com/office/powerpoint/2010/main" val="1268793391"/>
               </p:ext>
             </p:extLst>
           </p:nvPr>
         </p:nvGraphicFramePr>
         <p:xfrm>
-          <a:off x="457200" y="3282327"/>
-          <a:ext cx="11061700" cy="1414463"/>
-        </p:xfrm>
-        <a:graphic>
-          <a:graphicData uri="http://schemas.openxmlformats.org/presentationml/2006/ole">
-            <mc:AlternateContent xmlns:mc="http://schemas.openxmlformats.org/markup-compatibility/2006">
-              <mc:Choice xmlns:v="urn:schemas-microsoft-com:vml" Requires="v">
-                <p:oleObj spid="_x0000_s8271" name="Document" r:id="rId7" imgW="5422900" imgH="698500" progId="Word.Document.12">
-                  <p:embed/>
-                </p:oleObj>
-              </mc:Choice>
-              <mc:Fallback>
-                <p:oleObj name="Document" r:id="rId7" imgW="5422900" imgH="698500" progId="Word.Document.12">
-                  <p:embed/>
-                  <p:pic>
-                    <p:nvPicPr>
-                      <p:cNvPr id="0" name=""/>
-                      <p:cNvPicPr/>
-                      <p:nvPr/>
-                    </p:nvPicPr>
-                    <p:blipFill>
-                      <a:blip r:embed="rId8"/>
-                      <a:stretch>
-                        <a:fillRect/>
-                      </a:stretch>
-                    </p:blipFill>
-                    <p:spPr>
-                      <a:xfrm>
-                        <a:off x="457200" y="3282327"/>
-                        <a:ext cx="11061700" cy="1414463"/>
-                      </a:xfrm>
-                      <a:prstGeom prst="rect">
-                        <a:avLst/>
-                      </a:prstGeom>
-                    </p:spPr>
-                  </p:pic>
-                </p:oleObj>
-              </mc:Fallback>
-            </mc:AlternateContent>
-          </a:graphicData>
-        </a:graphic>
-      </p:graphicFrame>
-      <p:graphicFrame>
-        <p:nvGraphicFramePr>
-          <p:cNvPr id="9" name="Object 8"/>
-          <p:cNvGraphicFramePr>
-            <a:graphicFrameLocks noChangeAspect="1"/>
-          </p:cNvGraphicFramePr>
-          <p:nvPr>
-            <p:extLst>
-              <p:ext uri="{D42A27DB-BD31-4B8C-83A1-F6EECF244321}">
-                <p14:modId xmlns:p14="http://schemas.microsoft.com/office/powerpoint/2010/main" val="2060593568"/>
-              </p:ext>
-            </p:extLst>
-          </p:nvPr>
-        </p:nvGraphicFramePr>
-        <p:xfrm>
-          <a:off x="1403739" y="4102961"/>
+          <a:off x="457200" y="4120775"/>
           <a:ext cx="11061700" cy="1414462"/>
         </p:xfrm>
         <a:graphic>
           <a:graphicData uri="http://schemas.openxmlformats.org/presentationml/2006/ole">
             <mc:AlternateContent xmlns:mc="http://schemas.openxmlformats.org/markup-compatibility/2006">
               <mc:Choice xmlns:v="urn:schemas-microsoft-com:vml" Requires="v">
-                <p:oleObj spid="_x0000_s8272" name="Document" r:id="rId9" imgW="5422900" imgH="698500" progId="Word.Document.12">
+                <p:oleObj spid="_x0000_s10249" name="Document" r:id="rId9" imgW="5422900" imgH="698500" progId="Word.Document.12">
                   <p:embed/>
                 </p:oleObj>
               </mc:Choice>
@@ -7209,7 +7654,7 @@
                     </p:blipFill>
                     <p:spPr>
                       <a:xfrm>
-                        <a:off x="1403739" y="4102961"/>
+                        <a:off x="457200" y="4120775"/>
                         <a:ext cx="11061700" cy="1414462"/>
                       </a:xfrm>
                       <a:prstGeom prst="rect">
@@ -7225,27 +7670,27 @@
       </p:graphicFrame>
       <p:graphicFrame>
         <p:nvGraphicFramePr>
-          <p:cNvPr id="10" name="Object 9"/>
+          <p:cNvPr id="14" name="Object 13"/>
           <p:cNvGraphicFramePr>
             <a:graphicFrameLocks noChangeAspect="1"/>
           </p:cNvGraphicFramePr>
           <p:nvPr>
             <p:extLst>
               <p:ext uri="{D42A27DB-BD31-4B8C-83A1-F6EECF244321}">
-                <p14:modId xmlns:p14="http://schemas.microsoft.com/office/powerpoint/2010/main" val="3527200554"/>
+                <p14:modId xmlns:p14="http://schemas.microsoft.com/office/powerpoint/2010/main" val="3549422020"/>
               </p:ext>
             </p:extLst>
           </p:nvPr>
         </p:nvGraphicFramePr>
         <p:xfrm>
-          <a:off x="457200" y="5028503"/>
+          <a:off x="1403739" y="4889044"/>
           <a:ext cx="11061700" cy="1414462"/>
         </p:xfrm>
         <a:graphic>
           <a:graphicData uri="http://schemas.openxmlformats.org/presentationml/2006/ole">
             <mc:AlternateContent xmlns:mc="http://schemas.openxmlformats.org/markup-compatibility/2006">
               <mc:Choice xmlns:v="urn:schemas-microsoft-com:vml" Requires="v">
-                <p:oleObj spid="_x0000_s8273" name="Document" r:id="rId11" imgW="5422900" imgH="698500" progId="Word.Document.12">
+                <p:oleObj spid="_x0000_s10250" name="Document" r:id="rId11" imgW="5422900" imgH="698500" progId="Word.Document.12">
                   <p:embed/>
                 </p:oleObj>
               </mc:Choice>
@@ -7266,64 +7711,7 @@
                     </p:blipFill>
                     <p:spPr>
                       <a:xfrm>
-                        <a:off x="457200" y="5028503"/>
-                        <a:ext cx="11061700" cy="1414462"/>
-                      </a:xfrm>
-                      <a:prstGeom prst="rect">
-                        <a:avLst/>
-                      </a:prstGeom>
-                    </p:spPr>
-                  </p:pic>
-                </p:oleObj>
-              </mc:Fallback>
-            </mc:AlternateContent>
-          </a:graphicData>
-        </a:graphic>
-      </p:graphicFrame>
-      <p:graphicFrame>
-        <p:nvGraphicFramePr>
-          <p:cNvPr id="12" name="Object 11"/>
-          <p:cNvGraphicFramePr>
-            <a:graphicFrameLocks noChangeAspect="1"/>
-          </p:cNvGraphicFramePr>
-          <p:nvPr>
-            <p:extLst>
-              <p:ext uri="{D42A27DB-BD31-4B8C-83A1-F6EECF244321}">
-                <p14:modId xmlns:p14="http://schemas.microsoft.com/office/powerpoint/2010/main" val="968814220"/>
-              </p:ext>
-            </p:extLst>
-          </p:nvPr>
-        </p:nvGraphicFramePr>
-        <p:xfrm>
-          <a:off x="1403739" y="5796772"/>
-          <a:ext cx="11061700" cy="1414462"/>
-        </p:xfrm>
-        <a:graphic>
-          <a:graphicData uri="http://schemas.openxmlformats.org/presentationml/2006/ole">
-            <mc:AlternateContent xmlns:mc="http://schemas.openxmlformats.org/markup-compatibility/2006">
-              <mc:Choice xmlns:v="urn:schemas-microsoft-com:vml" Requires="v">
-                <p:oleObj spid="_x0000_s8274" name="Document" r:id="rId13" imgW="5422900" imgH="698500" progId="Word.Document.12">
-                  <p:embed/>
-                </p:oleObj>
-              </mc:Choice>
-              <mc:Fallback>
-                <p:oleObj name="Document" r:id="rId13" imgW="5422900" imgH="698500" progId="Word.Document.12">
-                  <p:embed/>
-                  <p:pic>
-                    <p:nvPicPr>
-                      <p:cNvPr id="0" name=""/>
-                      <p:cNvPicPr/>
-                      <p:nvPr/>
-                    </p:nvPicPr>
-                    <p:blipFill>
-                      <a:blip r:embed="rId14"/>
-                      <a:stretch>
-                        <a:fillRect/>
-                      </a:stretch>
-                    </p:blipFill>
-                    <p:spPr>
-                      <a:xfrm>
-                        <a:off x="1403739" y="5796772"/>
+                        <a:off x="1403739" y="4889044"/>
                         <a:ext cx="11061700" cy="1414462"/>
                       </a:xfrm>
                       <a:prstGeom prst="rect">
@@ -7340,7 +7728,7 @@
     </p:spTree>
     <p:extLst>
       <p:ext uri="{BB962C8B-B14F-4D97-AF65-F5344CB8AC3E}">
-        <p14:creationId xmlns:p14="http://schemas.microsoft.com/office/powerpoint/2010/main" val="3722760400"/>
+        <p14:creationId xmlns:p14="http://schemas.microsoft.com/office/powerpoint/2010/main" val="3829031096"/>
       </p:ext>
     </p:extLst>
   </p:cSld>
@@ -7356,7 +7744,7 @@
     <p:bg>
       <p:bgPr>
         <a:solidFill>
-          <a:srgbClr val="FFCC66"/>
+          <a:srgbClr val="6666FF"/>
         </a:solidFill>
         <a:effectLst/>
       </p:bgPr>
@@ -7382,13 +7770,13 @@
             <a:spLocks noGrp="1"/>
           </p:cNvSpPr>
           <p:nvPr>
-            <p:ph type="ctrTitle"/>
+            <p:ph type="title"/>
           </p:nvPr>
         </p:nvSpPr>
         <p:spPr>
           <a:xfrm>
-            <a:off x="491852" y="559944"/>
-            <a:ext cx="7414179" cy="707512"/>
+            <a:off x="215453" y="274638"/>
+            <a:ext cx="8822237" cy="1143000"/>
           </a:xfrm>
         </p:spPr>
         <p:txBody>
@@ -7399,96 +7787,281 @@
           <a:p>
             <a:pPr algn="l"/>
             <a:r>
-              <a:rPr lang="en-US" sz="6000" dirty="0" smtClean="0">
-                <a:solidFill>
-                  <a:srgbClr val="000000"/>
-                </a:solidFill>
-                <a:cs typeface="Oswald Regular"/>
-              </a:rPr>
-              <a:t>Varying </a:t>
-            </a:r>
-            <a:r>
-              <a:rPr lang="en-US" sz="6000" dirty="0" smtClean="0">
-                <a:solidFill>
-                  <a:srgbClr val="000000"/>
-                </a:solidFill>
-                <a:latin typeface="Lucida Grande"/>
-                <a:ea typeface="Lucida Grande"/>
-                <a:cs typeface="Lucida Grande"/>
-              </a:rPr>
-              <a:t>β</a:t>
-            </a:r>
-            <a:endParaRPr lang="en-US" sz="6000" dirty="0">
+              <a:rPr lang="en-US" dirty="0" smtClean="0">
+                <a:solidFill>
+                  <a:srgbClr val="FFFFFF"/>
+                </a:solidFill>
+              </a:rPr>
+              <a:t>Free energy functional cont’d</a:t>
+            </a:r>
+            <a:endParaRPr lang="en-US" dirty="0">
               <a:solidFill>
-                <a:srgbClr val="000000"/>
+                <a:srgbClr val="FFFFFF"/>
               </a:solidFill>
-              <a:cs typeface="Oswald Regular"/>
             </a:endParaRPr>
           </a:p>
         </p:txBody>
       </p:sp>
-      <p:sp>
-        <p:nvSpPr>
-          <p:cNvPr id="6" name="TextBox 5"/>
-          <p:cNvSpPr txBox="1"/>
+      <p:pic>
+        <p:nvPicPr>
+          <p:cNvPr id="4" name="Picture 3" descr="T5.png"/>
+          <p:cNvPicPr>
+            <a:picLocks noChangeAspect="1"/>
+          </p:cNvPicPr>
           <p:nvPr/>
-        </p:nvSpPr>
+        </p:nvPicPr>
+        <p:blipFill>
+          <a:blip r:embed="rId3">
+            <a:extLst>
+              <a:ext uri="{28A0092B-C50C-407E-A947-70E740481C1C}">
+                <a14:useLocalDpi xmlns:a14="http://schemas.microsoft.com/office/drawing/2010/main" val="0"/>
+              </a:ext>
+            </a:extLst>
+          </a:blip>
+          <a:stretch>
+            <a:fillRect/>
+          </a:stretch>
+        </p:blipFill>
         <p:spPr>
           <a:xfrm>
-            <a:off x="4791118" y="2099039"/>
-            <a:ext cx="184666" cy="369332"/>
+            <a:off x="1828800" y="3145176"/>
+            <a:ext cx="5486400" cy="533400"/>
           </a:xfrm>
           <a:prstGeom prst="rect">
             <a:avLst/>
           </a:prstGeom>
-          <a:noFill/>
         </p:spPr>
-        <p:txBody>
-          <a:bodyPr wrap="none" rtlCol="0">
-            <a:spAutoFit/>
-          </a:bodyPr>
-          <a:lstStyle/>
-          <a:p>
-            <a:endParaRPr lang="en-US" dirty="0"/>
-          </a:p>
-        </p:txBody>
-      </p:sp>
-      <p:sp>
-        <p:nvSpPr>
-          <p:cNvPr id="3" name="TextBox 2"/>
-          <p:cNvSpPr txBox="1"/>
+      </p:pic>
+      <p:graphicFrame>
+        <p:nvGraphicFramePr>
+          <p:cNvPr id="11" name="Object 10"/>
+          <p:cNvGraphicFramePr>
+            <a:graphicFrameLocks noChangeAspect="1"/>
+          </p:cNvGraphicFramePr>
+          <p:nvPr>
+            <p:extLst>
+              <p:ext uri="{D42A27DB-BD31-4B8C-83A1-F6EECF244321}">
+                <p14:modId xmlns:p14="http://schemas.microsoft.com/office/powerpoint/2010/main" val="1348892047"/>
+              </p:ext>
+            </p:extLst>
+          </p:nvPr>
+        </p:nvGraphicFramePr>
+        <p:xfrm>
+          <a:off x="457200" y="1443480"/>
+          <a:ext cx="11061700" cy="1414463"/>
+        </p:xfrm>
+        <a:graphic>
+          <a:graphicData uri="http://schemas.openxmlformats.org/presentationml/2006/ole">
+            <mc:AlternateContent xmlns:mc="http://schemas.openxmlformats.org/markup-compatibility/2006">
+              <mc:Choice xmlns:v="urn:schemas-microsoft-com:vml" Requires="v">
+                <p:oleObj spid="_x0000_s12289" name="Document" r:id="rId4" imgW="5422900" imgH="698500" progId="Word.Document.12">
+                  <p:embed/>
+                </p:oleObj>
+              </mc:Choice>
+              <mc:Fallback>
+                <p:oleObj name="Document" r:id="rId4" imgW="5422900" imgH="698500" progId="Word.Document.12">
+                  <p:embed/>
+                  <p:pic>
+                    <p:nvPicPr>
+                      <p:cNvPr id="0" name=""/>
+                      <p:cNvPicPr/>
+                      <p:nvPr/>
+                    </p:nvPicPr>
+                    <p:blipFill>
+                      <a:blip r:embed="rId5"/>
+                      <a:stretch>
+                        <a:fillRect/>
+                      </a:stretch>
+                    </p:blipFill>
+                    <p:spPr>
+                      <a:xfrm>
+                        <a:off x="457200" y="1443480"/>
+                        <a:ext cx="11061700" cy="1414463"/>
+                      </a:xfrm>
+                      <a:prstGeom prst="rect">
+                        <a:avLst/>
+                      </a:prstGeom>
+                    </p:spPr>
+                  </p:pic>
+                </p:oleObj>
+              </mc:Fallback>
+            </mc:AlternateContent>
+          </a:graphicData>
+        </a:graphic>
+      </p:graphicFrame>
+      <p:graphicFrame>
+        <p:nvGraphicFramePr>
+          <p:cNvPr id="13" name="Object 12"/>
+          <p:cNvGraphicFramePr>
+            <a:graphicFrameLocks noChangeAspect="1"/>
+          </p:cNvGraphicFramePr>
+          <p:nvPr>
+            <p:extLst>
+              <p:ext uri="{D42A27DB-BD31-4B8C-83A1-F6EECF244321}">
+                <p14:modId xmlns:p14="http://schemas.microsoft.com/office/powerpoint/2010/main" val="2116782725"/>
+              </p:ext>
+            </p:extLst>
+          </p:nvPr>
+        </p:nvGraphicFramePr>
+        <p:xfrm>
+          <a:off x="1403739" y="2264114"/>
+          <a:ext cx="11061700" cy="1414462"/>
+        </p:xfrm>
+        <a:graphic>
+          <a:graphicData uri="http://schemas.openxmlformats.org/presentationml/2006/ole">
+            <mc:AlternateContent xmlns:mc="http://schemas.openxmlformats.org/markup-compatibility/2006">
+              <mc:Choice xmlns:v="urn:schemas-microsoft-com:vml" Requires="v">
+                <p:oleObj spid="_x0000_s12290" name="Document" r:id="rId6" imgW="5422900" imgH="698500" progId="Word.Document.12">
+                  <p:embed/>
+                </p:oleObj>
+              </mc:Choice>
+              <mc:Fallback>
+                <p:oleObj name="Document" r:id="rId6" imgW="5422900" imgH="698500" progId="Word.Document.12">
+                  <p:embed/>
+                  <p:pic>
+                    <p:nvPicPr>
+                      <p:cNvPr id="0" name=""/>
+                      <p:cNvPicPr/>
+                      <p:nvPr/>
+                    </p:nvPicPr>
+                    <p:blipFill>
+                      <a:blip r:embed="rId7"/>
+                      <a:stretch>
+                        <a:fillRect/>
+                      </a:stretch>
+                    </p:blipFill>
+                    <p:spPr>
+                      <a:xfrm>
+                        <a:off x="1403739" y="2264114"/>
+                        <a:ext cx="11061700" cy="1414462"/>
+                      </a:xfrm>
+                      <a:prstGeom prst="rect">
+                        <a:avLst/>
+                      </a:prstGeom>
+                    </p:spPr>
+                  </p:pic>
+                </p:oleObj>
+              </mc:Fallback>
+            </mc:AlternateContent>
+          </a:graphicData>
+        </a:graphic>
+      </p:graphicFrame>
+    </p:spTree>
+    <p:extLst>
+      <p:ext uri="{BB962C8B-B14F-4D97-AF65-F5344CB8AC3E}">
+        <p14:creationId xmlns:p14="http://schemas.microsoft.com/office/powerpoint/2010/main" val="2154499417"/>
+      </p:ext>
+    </p:extLst>
+  </p:cSld>
+  <p:clrMapOvr>
+    <a:masterClrMapping/>
+  </p:clrMapOvr>
+</p:sld>
+</file>
+
+<file path=ppt/slides/slide8.xml><?xml version="1.0" encoding="utf-8"?>
+<p:sld xmlns:a="http://schemas.openxmlformats.org/drawingml/2006/main" xmlns:r="http://schemas.openxmlformats.org/officeDocument/2006/relationships" xmlns:p="http://schemas.openxmlformats.org/presentationml/2006/main">
+  <p:cSld>
+    <p:bg>
+      <p:bgPr>
+        <a:solidFill>
+          <a:srgbClr val="9966CC"/>
+        </a:solidFill>
+        <a:effectLst/>
+      </p:bgPr>
+    </p:bg>
+    <p:spTree>
+      <p:nvGrpSpPr>
+        <p:cNvPr id="1" name=""/>
+        <p:cNvGrpSpPr/>
+        <p:nvPr/>
+      </p:nvGrpSpPr>
+      <p:grpSpPr>
+        <a:xfrm>
+          <a:off x="0" y="0"/>
+          <a:ext cx="0" cy="0"/>
+          <a:chOff x="0" y="0"/>
+          <a:chExt cx="0" cy="0"/>
+        </a:xfrm>
+      </p:grpSpPr>
+      <p:sp>
+        <p:nvSpPr>
+          <p:cNvPr id="13" name="Title 1"/>
+          <p:cNvSpPr txBox="1">
+            <a:spLocks/>
+          </p:cNvSpPr>
           <p:nvPr/>
         </p:nvSpPr>
         <p:spPr>
           <a:xfrm>
-            <a:off x="3793678" y="1055711"/>
-            <a:ext cx="184666" cy="369332"/>
+            <a:off x="491852" y="410129"/>
+            <a:ext cx="7414179" cy="707512"/>
           </a:xfrm>
           <a:prstGeom prst="rect">
             <a:avLst/>
           </a:prstGeom>
-          <a:noFill/>
         </p:spPr>
         <p:txBody>
-          <a:bodyPr wrap="none" rtlCol="0">
-            <a:spAutoFit/>
+          <a:bodyPr vert="horz" lIns="91440" tIns="45720" rIns="91440" bIns="45720" rtlCol="0" anchor="ctr">
+            <a:noAutofit/>
           </a:bodyPr>
-          <a:lstStyle/>
-          <a:p>
-            <a:endParaRPr lang="en-US" dirty="0"/>
+          <a:lstStyle>
+            <a:lvl1pPr algn="ctr" defTabSz="457200" rtl="0" eaLnBrk="1" latinLnBrk="0" hangingPunct="1">
+              <a:spcBef>
+                <a:spcPct val="0"/>
+              </a:spcBef>
+              <a:buNone/>
+              <a:defRPr sz="4400" kern="1200">
+                <a:solidFill>
+                  <a:schemeClr val="tx1"/>
+                </a:solidFill>
+                <a:latin typeface="Oswald Regular"/>
+                <a:ea typeface="+mj-ea"/>
+                <a:cs typeface="+mj-cs"/>
+              </a:defRPr>
+            </a:lvl1pPr>
+          </a:lstStyle>
+          <a:p>
+            <a:pPr algn="l"/>
+            <a:r>
+              <a:rPr lang="en-US" sz="4000" dirty="0" smtClean="0">
+                <a:solidFill>
+                  <a:schemeClr val="bg1"/>
+                </a:solidFill>
+                <a:cs typeface="Oswald Regular"/>
+              </a:rPr>
+              <a:t>Varying </a:t>
+            </a:r>
+            <a:r>
+              <a:rPr lang="en-US" sz="4000" dirty="0" smtClean="0">
+                <a:solidFill>
+                  <a:schemeClr val="bg1"/>
+                </a:solidFill>
+                <a:latin typeface="Lucida Grande"/>
+                <a:ea typeface="Lucida Grande"/>
+                <a:cs typeface="Lucida Grande"/>
+              </a:rPr>
+              <a:t>β</a:t>
+            </a:r>
+            <a:endParaRPr lang="en-US" sz="4000" dirty="0">
+              <a:solidFill>
+                <a:schemeClr val="bg1"/>
+              </a:solidFill>
+              <a:cs typeface="Oswald Regular"/>
+            </a:endParaRPr>
           </a:p>
         </p:txBody>
       </p:sp>
       <p:pic>
         <p:nvPicPr>
-          <p:cNvPr id="7" name="Picture 6"/>
+          <p:cNvPr id="14" name="Picture 13"/>
           <p:cNvPicPr>
             <a:picLocks noChangeAspect="1"/>
           </p:cNvPicPr>
           <p:nvPr/>
         </p:nvPicPr>
         <p:blipFill rotWithShape="1">
-          <a:blip r:embed="rId2">
+          <a:blip r:embed="rId3">
             <a:extLst>
               <a:ext uri="{28A0092B-C50C-407E-A947-70E740481C1C}">
                 <a14:useLocalDpi xmlns:a14="http://schemas.microsoft.com/office/drawing/2010/main" val="0"/>
@@ -7500,7 +8073,7 @@
         </p:blipFill>
         <p:spPr>
           <a:xfrm>
-            <a:off x="1743847" y="1749282"/>
+            <a:off x="2114281" y="1590512"/>
             <a:ext cx="6094624" cy="4652405"/>
           </a:xfrm>
           <a:prstGeom prst="rect">
@@ -7508,27 +8081,454 @@
           </a:prstGeom>
         </p:spPr>
       </p:pic>
+      <p:cxnSp>
+        <p:nvCxnSpPr>
+          <p:cNvPr id="8" name="Straight Arrow Connector 7"/>
+          <p:cNvCxnSpPr/>
+          <p:nvPr/>
+        </p:nvCxnSpPr>
+        <p:spPr>
+          <a:xfrm>
+            <a:off x="4409935" y="1471397"/>
+            <a:ext cx="194037" cy="697333"/>
+          </a:xfrm>
+          <a:prstGeom prst="straightConnector1">
+            <a:avLst/>
+          </a:prstGeom>
+          <a:ln w="28575" cmpd="sng">
+            <a:solidFill>
+              <a:schemeClr val="tx1"/>
+            </a:solidFill>
+            <a:tailEnd type="arrow"/>
+          </a:ln>
+          <a:effectLst/>
+        </p:spPr>
+        <p:style>
+          <a:lnRef idx="2">
+            <a:schemeClr val="accent1"/>
+          </a:lnRef>
+          <a:fillRef idx="0">
+            <a:schemeClr val="accent1"/>
+          </a:fillRef>
+          <a:effectRef idx="1">
+            <a:schemeClr val="accent1"/>
+          </a:effectRef>
+          <a:fontRef idx="minor">
+            <a:schemeClr val="tx1"/>
+          </a:fontRef>
+        </p:style>
+      </p:cxnSp>
+      <p:sp>
+        <p:nvSpPr>
+          <p:cNvPr id="17" name="Title 1"/>
+          <p:cNvSpPr txBox="1">
+            <a:spLocks/>
+          </p:cNvSpPr>
+          <p:nvPr/>
+        </p:nvSpPr>
+        <p:spPr>
+          <a:xfrm>
+            <a:off x="3492673" y="763885"/>
+            <a:ext cx="1763974" cy="707512"/>
+          </a:xfrm>
+          <a:prstGeom prst="rect">
+            <a:avLst/>
+          </a:prstGeom>
+        </p:spPr>
+        <p:txBody>
+          <a:bodyPr vert="horz" lIns="91440" tIns="45720" rIns="91440" bIns="45720" rtlCol="0" anchor="ctr">
+            <a:noAutofit/>
+          </a:bodyPr>
+          <a:lstStyle>
+            <a:lvl1pPr algn="ctr" defTabSz="457200" rtl="0" eaLnBrk="1" latinLnBrk="0" hangingPunct="1">
+              <a:spcBef>
+                <a:spcPct val="0"/>
+              </a:spcBef>
+              <a:buNone/>
+              <a:defRPr sz="4400" kern="1200">
+                <a:solidFill>
+                  <a:schemeClr val="tx1"/>
+                </a:solidFill>
+                <a:latin typeface="Oswald Regular"/>
+                <a:ea typeface="+mj-ea"/>
+                <a:cs typeface="+mj-cs"/>
+              </a:defRPr>
+            </a:lvl1pPr>
+          </a:lstStyle>
+          <a:p>
+            <a:r>
+              <a:rPr lang="en-US" sz="2400" dirty="0" smtClean="0">
+                <a:solidFill>
+                  <a:schemeClr val="bg1"/>
+                </a:solidFill>
+                <a:cs typeface="Oswald Regular"/>
+              </a:rPr>
+              <a:t>prior distribution</a:t>
+            </a:r>
+            <a:endParaRPr lang="en-US" sz="2400" dirty="0">
+              <a:solidFill>
+                <a:schemeClr val="bg1"/>
+              </a:solidFill>
+              <a:cs typeface="Oswald Regular"/>
+            </a:endParaRPr>
+          </a:p>
+        </p:txBody>
+      </p:sp>
+      <p:cxnSp>
+        <p:nvCxnSpPr>
+          <p:cNvPr id="20" name="Straight Arrow Connector 19"/>
+          <p:cNvCxnSpPr>
+            <a:stCxn id="21" idx="2"/>
+          </p:cNvCxnSpPr>
+          <p:nvPr/>
+        </p:nvCxnSpPr>
+        <p:spPr>
+          <a:xfrm flipH="1">
+            <a:off x="7155382" y="1421081"/>
+            <a:ext cx="881986" cy="747649"/>
+          </a:xfrm>
+          <a:prstGeom prst="straightConnector1">
+            <a:avLst/>
+          </a:prstGeom>
+          <a:ln w="28575" cmpd="sng">
+            <a:solidFill>
+              <a:schemeClr val="tx1"/>
+            </a:solidFill>
+            <a:tailEnd type="arrow"/>
+          </a:ln>
+          <a:effectLst/>
+        </p:spPr>
+        <p:style>
+          <a:lnRef idx="2">
+            <a:schemeClr val="accent1"/>
+          </a:lnRef>
+          <a:fillRef idx="0">
+            <a:schemeClr val="accent1"/>
+          </a:fillRef>
+          <a:effectRef idx="1">
+            <a:schemeClr val="accent1"/>
+          </a:effectRef>
+          <a:fontRef idx="minor">
+            <a:schemeClr val="tx1"/>
+          </a:fontRef>
+        </p:style>
+      </p:cxnSp>
+      <p:sp>
+        <p:nvSpPr>
+          <p:cNvPr id="21" name="Title 1"/>
+          <p:cNvSpPr txBox="1">
+            <a:spLocks/>
+          </p:cNvSpPr>
+          <p:nvPr/>
+        </p:nvSpPr>
+        <p:spPr>
+          <a:xfrm>
+            <a:off x="7155381" y="713569"/>
+            <a:ext cx="1763974" cy="707512"/>
+          </a:xfrm>
+          <a:prstGeom prst="rect">
+            <a:avLst/>
+          </a:prstGeom>
+        </p:spPr>
+        <p:txBody>
+          <a:bodyPr vert="horz" lIns="91440" tIns="45720" rIns="91440" bIns="45720" rtlCol="0" anchor="ctr">
+            <a:noAutofit/>
+          </a:bodyPr>
+          <a:lstStyle>
+            <a:lvl1pPr algn="ctr" defTabSz="457200" rtl="0" eaLnBrk="1" latinLnBrk="0" hangingPunct="1">
+              <a:spcBef>
+                <a:spcPct val="0"/>
+              </a:spcBef>
+              <a:buNone/>
+              <a:defRPr sz="4400" kern="1200">
+                <a:solidFill>
+                  <a:schemeClr val="tx1"/>
+                </a:solidFill>
+                <a:latin typeface="Oswald Regular"/>
+                <a:ea typeface="+mj-ea"/>
+                <a:cs typeface="+mj-cs"/>
+              </a:defRPr>
+            </a:lvl1pPr>
+          </a:lstStyle>
+          <a:p>
+            <a:r>
+              <a:rPr lang="en-US" sz="2400" dirty="0">
+                <a:solidFill>
+                  <a:schemeClr val="bg1"/>
+                </a:solidFill>
+                <a:cs typeface="Oswald Regular"/>
+              </a:rPr>
+              <a:t>t</a:t>
+            </a:r>
+            <a:r>
+              <a:rPr lang="en-US" sz="2400" dirty="0" smtClean="0">
+                <a:solidFill>
+                  <a:schemeClr val="bg1"/>
+                </a:solidFill>
+                <a:cs typeface="Oswald Regular"/>
+              </a:rPr>
+              <a:t>rue posterior</a:t>
+            </a:r>
+            <a:endParaRPr lang="en-US" sz="2400" dirty="0">
+              <a:solidFill>
+                <a:schemeClr val="bg1"/>
+              </a:solidFill>
+              <a:cs typeface="Oswald Regular"/>
+            </a:endParaRPr>
+          </a:p>
+        </p:txBody>
+      </p:sp>
+      <p:cxnSp>
+        <p:nvCxnSpPr>
+          <p:cNvPr id="26" name="Straight Arrow Connector 25"/>
+          <p:cNvCxnSpPr>
+            <a:stCxn id="27" idx="3"/>
+          </p:cNvCxnSpPr>
+          <p:nvPr/>
+        </p:nvCxnSpPr>
+        <p:spPr>
+          <a:xfrm>
+            <a:off x="1975656" y="4010790"/>
+            <a:ext cx="1517017" cy="170164"/>
+          </a:xfrm>
+          <a:prstGeom prst="straightConnector1">
+            <a:avLst/>
+          </a:prstGeom>
+          <a:ln w="28575" cmpd="sng">
+            <a:solidFill>
+              <a:schemeClr val="tx1"/>
+            </a:solidFill>
+            <a:tailEnd type="arrow"/>
+          </a:ln>
+          <a:effectLst/>
+        </p:spPr>
+        <p:style>
+          <a:lnRef idx="2">
+            <a:schemeClr val="accent1"/>
+          </a:lnRef>
+          <a:fillRef idx="0">
+            <a:schemeClr val="accent1"/>
+          </a:fillRef>
+          <a:effectRef idx="1">
+            <a:schemeClr val="accent1"/>
+          </a:effectRef>
+          <a:fontRef idx="minor">
+            <a:schemeClr val="tx1"/>
+          </a:fontRef>
+        </p:style>
+      </p:cxnSp>
+      <p:sp>
+        <p:nvSpPr>
+          <p:cNvPr id="27" name="Title 1"/>
+          <p:cNvSpPr txBox="1">
+            <a:spLocks/>
+          </p:cNvSpPr>
+          <p:nvPr/>
+        </p:nvSpPr>
+        <p:spPr>
+          <a:xfrm>
+            <a:off x="211682" y="3657034"/>
+            <a:ext cx="1763974" cy="707512"/>
+          </a:xfrm>
+          <a:prstGeom prst="rect">
+            <a:avLst/>
+          </a:prstGeom>
+        </p:spPr>
+        <p:txBody>
+          <a:bodyPr vert="horz" lIns="91440" tIns="45720" rIns="91440" bIns="45720" rtlCol="0" anchor="ctr">
+            <a:noAutofit/>
+          </a:bodyPr>
+          <a:lstStyle>
+            <a:lvl1pPr algn="ctr" defTabSz="457200" rtl="0" eaLnBrk="1" latinLnBrk="0" hangingPunct="1">
+              <a:spcBef>
+                <a:spcPct val="0"/>
+              </a:spcBef>
+              <a:buNone/>
+              <a:defRPr sz="4400" kern="1200">
+                <a:solidFill>
+                  <a:schemeClr val="tx1"/>
+                </a:solidFill>
+                <a:latin typeface="Oswald Regular"/>
+                <a:ea typeface="+mj-ea"/>
+                <a:cs typeface="+mj-cs"/>
+              </a:defRPr>
+            </a:lvl1pPr>
+          </a:lstStyle>
+          <a:p>
+            <a:r>
+              <a:rPr lang="en-US" sz="2400" dirty="0">
+                <a:solidFill>
+                  <a:schemeClr val="bg1"/>
+                </a:solidFill>
+                <a:cs typeface="Oswald Regular"/>
+              </a:rPr>
+              <a:t>a</a:t>
+            </a:r>
+            <a:r>
+              <a:rPr lang="en-US" sz="2400" dirty="0" smtClean="0">
+                <a:solidFill>
+                  <a:schemeClr val="bg1"/>
+                </a:solidFill>
+                <a:cs typeface="Oswald Regular"/>
+              </a:rPr>
+              <a:t>pproximate</a:t>
+            </a:r>
+          </a:p>
+          <a:p>
+            <a:r>
+              <a:rPr lang="en-US" sz="2400" dirty="0" smtClean="0">
+                <a:solidFill>
+                  <a:schemeClr val="bg1"/>
+                </a:solidFill>
+                <a:cs typeface="Oswald Regular"/>
+              </a:rPr>
+              <a:t>posterior</a:t>
+            </a:r>
+            <a:endParaRPr lang="en-US" sz="2400" dirty="0">
+              <a:solidFill>
+                <a:schemeClr val="bg1"/>
+              </a:solidFill>
+              <a:cs typeface="Oswald Regular"/>
+            </a:endParaRPr>
+          </a:p>
+        </p:txBody>
+      </p:sp>
+      <p:sp>
+        <p:nvSpPr>
+          <p:cNvPr id="30" name="Title 1"/>
+          <p:cNvSpPr txBox="1">
+            <a:spLocks/>
+          </p:cNvSpPr>
+          <p:nvPr/>
+        </p:nvSpPr>
+        <p:spPr>
+          <a:xfrm>
+            <a:off x="3863108" y="3146373"/>
+            <a:ext cx="1763974" cy="707512"/>
+          </a:xfrm>
+          <a:prstGeom prst="rect">
+            <a:avLst/>
+          </a:prstGeom>
+        </p:spPr>
+        <p:txBody>
+          <a:bodyPr vert="horz" lIns="91440" tIns="45720" rIns="91440" bIns="45720" rtlCol="0" anchor="ctr">
+            <a:noAutofit/>
+          </a:bodyPr>
+          <a:lstStyle>
+            <a:lvl1pPr algn="ctr" defTabSz="457200" rtl="0" eaLnBrk="1" latinLnBrk="0" hangingPunct="1">
+              <a:spcBef>
+                <a:spcPct val="0"/>
+              </a:spcBef>
+              <a:buNone/>
+              <a:defRPr sz="4400" kern="1200">
+                <a:solidFill>
+                  <a:schemeClr val="tx1"/>
+                </a:solidFill>
+                <a:latin typeface="Oswald Regular"/>
+                <a:ea typeface="+mj-ea"/>
+                <a:cs typeface="+mj-cs"/>
+              </a:defRPr>
+            </a:lvl1pPr>
+          </a:lstStyle>
+          <a:p>
+            <a:r>
+              <a:rPr lang="en-US" sz="2400" dirty="0">
+                <a:cs typeface="Oswald Regular"/>
+              </a:rPr>
+              <a:t>l</a:t>
+            </a:r>
+            <a:r>
+              <a:rPr lang="en-US" sz="2400" dirty="0" smtClean="0">
+                <a:cs typeface="Oswald Regular"/>
+              </a:rPr>
+              <a:t>ow </a:t>
+            </a:r>
+            <a:r>
+              <a:rPr lang="en-US" sz="2400" dirty="0" smtClean="0">
+                <a:latin typeface="Lucida Grande"/>
+                <a:ea typeface="Lucida Grande"/>
+                <a:cs typeface="Lucida Grande"/>
+              </a:rPr>
+              <a:t>β</a:t>
+            </a:r>
+            <a:endParaRPr lang="en-US" sz="2400" dirty="0">
+              <a:cs typeface="Oswald Regular"/>
+            </a:endParaRPr>
+          </a:p>
+        </p:txBody>
+      </p:sp>
+      <p:sp>
+        <p:nvSpPr>
+          <p:cNvPr id="31" name="Title 1"/>
+          <p:cNvSpPr txBox="1">
+            <a:spLocks/>
+          </p:cNvSpPr>
+          <p:nvPr/>
+        </p:nvSpPr>
+        <p:spPr>
+          <a:xfrm>
+            <a:off x="6918204" y="3146373"/>
+            <a:ext cx="1763974" cy="707512"/>
+          </a:xfrm>
+          <a:prstGeom prst="rect">
+            <a:avLst/>
+          </a:prstGeom>
+        </p:spPr>
+        <p:txBody>
+          <a:bodyPr vert="horz" lIns="91440" tIns="45720" rIns="91440" bIns="45720" rtlCol="0" anchor="ctr">
+            <a:noAutofit/>
+          </a:bodyPr>
+          <a:lstStyle>
+            <a:lvl1pPr algn="ctr" defTabSz="457200" rtl="0" eaLnBrk="1" latinLnBrk="0" hangingPunct="1">
+              <a:spcBef>
+                <a:spcPct val="0"/>
+              </a:spcBef>
+              <a:buNone/>
+              <a:defRPr sz="4400" kern="1200">
+                <a:solidFill>
+                  <a:schemeClr val="tx1"/>
+                </a:solidFill>
+                <a:latin typeface="Oswald Regular"/>
+                <a:ea typeface="+mj-ea"/>
+                <a:cs typeface="+mj-cs"/>
+              </a:defRPr>
+            </a:lvl1pPr>
+          </a:lstStyle>
+          <a:p>
+            <a:r>
+              <a:rPr lang="en-US" sz="2400" dirty="0" smtClean="0">
+                <a:cs typeface="Oswald Regular"/>
+              </a:rPr>
+              <a:t>high </a:t>
+            </a:r>
+            <a:r>
+              <a:rPr lang="en-US" sz="2400" dirty="0" smtClean="0">
+                <a:latin typeface="Lucida Grande"/>
+                <a:ea typeface="Lucida Grande"/>
+                <a:cs typeface="Lucida Grande"/>
+              </a:rPr>
+              <a:t>β</a:t>
+            </a:r>
+            <a:endParaRPr lang="en-US" sz="2400" dirty="0">
+              <a:cs typeface="Oswald Regular"/>
+            </a:endParaRPr>
+          </a:p>
+        </p:txBody>
+      </p:sp>
     </p:spTree>
     <p:extLst>
       <p:ext uri="{BB962C8B-B14F-4D97-AF65-F5344CB8AC3E}">
-        <p14:creationId xmlns:p14="http://schemas.microsoft.com/office/powerpoint/2010/main" val="2949327548"/>
+        <p14:creationId xmlns:p14="http://schemas.microsoft.com/office/powerpoint/2010/main" val="539609506"/>
       </p:ext>
     </p:extLst>
   </p:cSld>
   <p:clrMapOvr>
     <a:masterClrMapping/>
   </p:clrMapOvr>
-  <p:timing>
-    <p:tnLst>
-      <p:par>
-        <p:cTn xmlns:p14="http://schemas.microsoft.com/office/powerpoint/2010/main" id="1" dur="indefinite" restart="never" nodeType="tmRoot"/>
-      </p:par>
-    </p:tnLst>
-  </p:timing>
 </p:sld>
 </file>
 
-<file path=ppt/slides/slide8.xml><?xml version="1.0" encoding="utf-8"?>
+<file path=ppt/slides/slide9.xml><?xml version="1.0" encoding="utf-8"?>
 <p:sld xmlns:a="http://schemas.openxmlformats.org/drawingml/2006/main" xmlns:r="http://schemas.openxmlformats.org/officeDocument/2006/relationships" xmlns:p="http://schemas.openxmlformats.org/presentationml/2006/main">
   <p:cSld>
     <p:bg>
@@ -7611,7 +8611,7 @@
           <p:nvPr/>
         </p:nvPicPr>
         <p:blipFill>
-          <a:blip r:embed="rId2">
+          <a:blip r:embed="rId3">
             <a:extLst>
               <a:ext uri="{28A0092B-C50C-407E-A947-70E740481C1C}">
                 <a14:useLocalDpi xmlns:a14="http://schemas.microsoft.com/office/drawing/2010/main" val="0"/>
@@ -7701,242 +8701,6 @@
       </p:par>
     </p:tnLst>
   </p:timing>
-</p:sld>
-</file>
-
-<file path=ppt/slides/slide9.xml><?xml version="1.0" encoding="utf-8"?>
-<p:sld xmlns:a="http://schemas.openxmlformats.org/drawingml/2006/main" xmlns:r="http://schemas.openxmlformats.org/officeDocument/2006/relationships" xmlns:p="http://schemas.openxmlformats.org/presentationml/2006/main">
-  <p:cSld>
-    <p:bg>
-      <p:bgPr>
-        <a:solidFill>
-          <a:schemeClr val="bg1">
-            <a:lumMod val="85000"/>
-          </a:schemeClr>
-        </a:solidFill>
-        <a:effectLst/>
-      </p:bgPr>
-    </p:bg>
-    <p:spTree>
-      <p:nvGrpSpPr>
-        <p:cNvPr id="1" name=""/>
-        <p:cNvGrpSpPr/>
-        <p:nvPr/>
-      </p:nvGrpSpPr>
-      <p:grpSpPr>
-        <a:xfrm>
-          <a:off x="0" y="0"/>
-          <a:ext cx="0" cy="0"/>
-          <a:chOff x="0" y="0"/>
-          <a:chExt cx="0" cy="0"/>
-        </a:xfrm>
-      </p:grpSpPr>
-      <p:sp>
-        <p:nvSpPr>
-          <p:cNvPr id="2" name="Title 1"/>
-          <p:cNvSpPr>
-            <a:spLocks noGrp="1"/>
-          </p:cNvSpPr>
-          <p:nvPr>
-            <p:ph type="title"/>
-          </p:nvPr>
-        </p:nvSpPr>
-        <p:spPr>
-          <a:xfrm>
-            <a:off x="457200" y="411877"/>
-            <a:ext cx="8229600" cy="1143000"/>
-          </a:xfrm>
-        </p:spPr>
-        <p:txBody>
-          <a:bodyPr>
-            <a:normAutofit/>
-          </a:bodyPr>
-          <a:lstStyle/>
-          <a:p>
-            <a:pPr algn="l"/>
-            <a:r>
-              <a:rPr lang="en-US" sz="6000" dirty="0" smtClean="0"/>
-              <a:t>Control as Optimality</a:t>
-            </a:r>
-            <a:endParaRPr lang="en-US" sz="6000" dirty="0"/>
-          </a:p>
-        </p:txBody>
-      </p:sp>
-      <p:sp>
-        <p:nvSpPr>
-          <p:cNvPr id="3" name="Content Placeholder 2"/>
-          <p:cNvSpPr>
-            <a:spLocks noGrp="1"/>
-          </p:cNvSpPr>
-          <p:nvPr>
-            <p:ph idx="1"/>
-          </p:nvPr>
-        </p:nvSpPr>
-        <p:spPr>
-          <a:xfrm>
-            <a:off x="634968" y="1567380"/>
-            <a:ext cx="7806366" cy="4749124"/>
-          </a:xfrm>
-        </p:spPr>
-        <p:txBody>
-          <a:bodyPr>
-            <a:normAutofit fontScale="92500" lnSpcReduction="10000"/>
-          </a:bodyPr>
-          <a:lstStyle/>
-          <a:p>
-            <a:pPr marL="0" indent="0">
-              <a:buNone/>
-            </a:pPr>
-            <a:r>
-              <a:rPr lang="en-US" sz="2800" dirty="0" smtClean="0">
-                <a:solidFill>
-                  <a:srgbClr val="000000"/>
-                </a:solidFill>
-                <a:latin typeface="Open Sans Cond Light"/>
-                <a:ea typeface="Lucida Grande"/>
-                <a:cs typeface="Open Sans Cond Light"/>
-              </a:rPr>
-              <a:t>Control belies mental illness</a:t>
-            </a:r>
-          </a:p>
-          <a:p>
-            <a:pPr marL="0" indent="0">
-              <a:buNone/>
-            </a:pPr>
-            <a:endParaRPr lang="en-US" sz="2800" dirty="0" smtClean="0">
-              <a:solidFill>
-                <a:srgbClr val="000000"/>
-              </a:solidFill>
-              <a:latin typeface="Open Sans Cond Light"/>
-              <a:ea typeface="Lucida Grande"/>
-              <a:cs typeface="Open Sans Cond Light"/>
-            </a:endParaRPr>
-          </a:p>
-          <a:p>
-            <a:pPr marL="0" indent="0">
-              <a:buNone/>
-            </a:pPr>
-            <a:r>
-              <a:rPr lang="en-US" sz="2800" dirty="0" smtClean="0">
-                <a:solidFill>
-                  <a:srgbClr val="000000"/>
-                </a:solidFill>
-                <a:latin typeface="Open Sans Cond Light"/>
-                <a:ea typeface="Lucida Grande"/>
-                <a:cs typeface="Open Sans Cond Light"/>
-              </a:rPr>
-              <a:t>Optimality and control are often linked (Todorov, optimal policy model).</a:t>
-            </a:r>
-          </a:p>
-          <a:p>
-            <a:pPr marL="0" indent="0">
-              <a:buNone/>
-            </a:pPr>
-            <a:endParaRPr lang="en-US" sz="2800" dirty="0">
-              <a:solidFill>
-                <a:srgbClr val="000000"/>
-              </a:solidFill>
-              <a:latin typeface="Open Sans Cond Light"/>
-              <a:ea typeface="Lucida Grande"/>
-              <a:cs typeface="Open Sans Cond Light"/>
-            </a:endParaRPr>
-          </a:p>
-          <a:p>
-            <a:pPr marL="0" indent="0">
-              <a:buNone/>
-            </a:pPr>
-            <a:r>
-              <a:rPr lang="en-US" sz="2800" dirty="0" smtClean="0">
-                <a:solidFill>
-                  <a:srgbClr val="000000"/>
-                </a:solidFill>
-                <a:latin typeface="Open Sans Cond Light"/>
-                <a:ea typeface="Lucida Grande"/>
-                <a:cs typeface="Open Sans Cond Light"/>
-              </a:rPr>
-              <a:t>β is the dial between optimality and constraint, or control and limitation.</a:t>
-            </a:r>
-          </a:p>
-          <a:p>
-            <a:pPr marL="0" indent="0">
-              <a:buNone/>
-            </a:pPr>
-            <a:endParaRPr lang="en-US" sz="2800" dirty="0" smtClean="0">
-              <a:solidFill>
-                <a:srgbClr val="000000"/>
-              </a:solidFill>
-              <a:latin typeface="Open Sans Cond Light"/>
-              <a:ea typeface="Lucida Grande"/>
-              <a:cs typeface="Open Sans Cond Light"/>
-            </a:endParaRPr>
-          </a:p>
-          <a:p>
-            <a:pPr marL="0" indent="0">
-              <a:buNone/>
-            </a:pPr>
-            <a:r>
-              <a:rPr lang="en-US" sz="2800" dirty="0" smtClean="0">
-                <a:solidFill>
-                  <a:srgbClr val="000000"/>
-                </a:solidFill>
-                <a:latin typeface="Open Sans Cond Light"/>
-                <a:ea typeface="Lucida Grande"/>
-                <a:cs typeface="Open Sans Cond Light"/>
-              </a:rPr>
-              <a:t>For cognitive tasks, β can be thought of as the index of perceived control (also interpreted as the index of rationality (</a:t>
-            </a:r>
-            <a:r>
-              <a:rPr lang="en-US" sz="2800" dirty="0" err="1" smtClean="0">
-                <a:solidFill>
-                  <a:srgbClr val="000000"/>
-                </a:solidFill>
-                <a:latin typeface="Open Sans Cond Light"/>
-                <a:ea typeface="Lucida Grande"/>
-                <a:cs typeface="Open Sans Cond Light"/>
-              </a:rPr>
-              <a:t>Wolpert</a:t>
-            </a:r>
-            <a:r>
-              <a:rPr lang="en-US" sz="2800" dirty="0" smtClean="0">
-                <a:solidFill>
-                  <a:srgbClr val="000000"/>
-                </a:solidFill>
-                <a:latin typeface="Open Sans Cond Light"/>
-                <a:ea typeface="Lucida Grande"/>
-                <a:cs typeface="Open Sans Cond Light"/>
-              </a:rPr>
-              <a:t>), Lagrangian multiplier</a:t>
-            </a:r>
-            <a:r>
-              <a:rPr lang="en-US" sz="2800" dirty="0" smtClean="0">
-                <a:solidFill>
-                  <a:srgbClr val="000000"/>
-                </a:solidFill>
-                <a:latin typeface="Open Sans Cond Light"/>
-                <a:cs typeface="Open Sans Cond Light"/>
-              </a:rPr>
-              <a:t>, resource parameter (Ortega, Braun), QRE).</a:t>
-            </a:r>
-            <a:endParaRPr lang="en-US" sz="2800" dirty="0">
-              <a:solidFill>
-                <a:srgbClr val="000000"/>
-              </a:solidFill>
-              <a:latin typeface="Open Sans Cond Light"/>
-              <a:cs typeface="Open Sans Cond Light"/>
-            </a:endParaRPr>
-          </a:p>
-        </p:txBody>
-      </p:sp>
-    </p:spTree>
-    <p:extLst>
-      <p:ext uri="{BB962C8B-B14F-4D97-AF65-F5344CB8AC3E}">
-        <p14:creationId xmlns:p14="http://schemas.microsoft.com/office/powerpoint/2010/main" val="2128591191"/>
-      </p:ext>
-    </p:extLst>
-  </p:cSld>
-  <p:clrMapOvr>
-    <a:masterClrMapping/>
-  </p:clrMapOvr>
 </p:sld>
 </file>
 

</xml_diff>